<commit_message>
Corrected typo "labels" to "levels" in NHANES ordination
</commit_message>
<xml_diff>
--- a/eg_data/NHANES/Laboratory_data/Ordination/Ordination summary.pptx
+++ b/eg_data/NHANES/Laboratory_data/Ordination/Ordination summary.pptx
@@ -25,14 +25,15 @@
     <p:sldId id="291" r:id="rId19"/>
     <p:sldId id="289" r:id="rId20"/>
     <p:sldId id="290" r:id="rId21"/>
-    <p:sldId id="292" r:id="rId22"/>
-    <p:sldId id="296" r:id="rId23"/>
-    <p:sldId id="298" r:id="rId24"/>
-    <p:sldId id="297" r:id="rId25"/>
-    <p:sldId id="299" r:id="rId26"/>
-    <p:sldId id="266" r:id="rId27"/>
-    <p:sldId id="269" r:id="rId28"/>
-    <p:sldId id="270" r:id="rId29"/>
+    <p:sldId id="298" r:id="rId22"/>
+    <p:sldId id="300" r:id="rId23"/>
+    <p:sldId id="297" r:id="rId24"/>
+    <p:sldId id="292" r:id="rId25"/>
+    <p:sldId id="296" r:id="rId26"/>
+    <p:sldId id="299" r:id="rId27"/>
+    <p:sldId id="266" r:id="rId28"/>
+    <p:sldId id="269" r:id="rId29"/>
+    <p:sldId id="270" r:id="rId30"/>
   </p:sldIdLst>
   <p:sldSz cx="12192000" cy="6858000"/>
   <p:notesSz cx="6858000" cy="9144000"/>
@@ -2916,7 +2917,7 @@
             <a:fld id="{D37C2CC6-8D09-460E-A36A-8BF1F4A55F79}" type="datetimeFigureOut">
               <a:rPr lang="en-US" smtClean="0"/>
               <a:pPr/>
-              <a:t>10/14/2022</a:t>
+              <a:t>10/19/2022</a:t>
             </a:fld>
             <a:endParaRPr lang="en-US" dirty="0"/>
           </a:p>
@@ -3127,7 +3128,7 @@
           <a:p>
             <a:fld id="{D37C2CC6-8D09-460E-A36A-8BF1F4A55F79}" type="datetimeFigureOut">
               <a:rPr lang="en-US" smtClean="0"/>
-              <a:t>10/14/2022</a:t>
+              <a:t>10/19/2022</a:t>
             </a:fld>
             <a:endParaRPr lang="en-US" dirty="0"/>
           </a:p>
@@ -3335,7 +3336,7 @@
           <a:p>
             <a:fld id="{D37C2CC6-8D09-460E-A36A-8BF1F4A55F79}" type="datetimeFigureOut">
               <a:rPr lang="en-US" smtClean="0"/>
-              <a:t>10/14/2022</a:t>
+              <a:t>10/19/2022</a:t>
             </a:fld>
             <a:endParaRPr lang="en-US" dirty="0"/>
           </a:p>
@@ -3578,7 +3579,7 @@
             <a:fld id="{D37C2CC6-8D09-460E-A36A-8BF1F4A55F79}" type="datetimeFigureOut">
               <a:rPr lang="en-US" smtClean="0"/>
               <a:pPr/>
-              <a:t>10/14/2022</a:t>
+              <a:t>10/19/2022</a:t>
             </a:fld>
             <a:endParaRPr lang="en-US" dirty="0"/>
           </a:p>
@@ -3860,7 +3861,7 @@
           <a:p>
             <a:fld id="{D37C2CC6-8D09-460E-A36A-8BF1F4A55F79}" type="datetimeFigureOut">
               <a:rPr lang="en-US" smtClean="0"/>
-              <a:t>10/14/2022</a:t>
+              <a:t>10/19/2022</a:t>
             </a:fld>
             <a:endParaRPr lang="en-US" dirty="0"/>
           </a:p>
@@ -4125,7 +4126,7 @@
           <a:p>
             <a:fld id="{D37C2CC6-8D09-460E-A36A-8BF1F4A55F79}" type="datetimeFigureOut">
               <a:rPr lang="en-US" smtClean="0"/>
-              <a:t>10/14/2022</a:t>
+              <a:t>10/19/2022</a:t>
             </a:fld>
             <a:endParaRPr lang="en-US" dirty="0"/>
           </a:p>
@@ -4537,7 +4538,7 @@
           <a:p>
             <a:fld id="{D37C2CC6-8D09-460E-A36A-8BF1F4A55F79}" type="datetimeFigureOut">
               <a:rPr lang="en-US" smtClean="0"/>
-              <a:t>10/14/2022</a:t>
+              <a:t>10/19/2022</a:t>
             </a:fld>
             <a:endParaRPr lang="en-US" dirty="0"/>
           </a:p>
@@ -4678,7 +4679,7 @@
           <a:p>
             <a:fld id="{D37C2CC6-8D09-460E-A36A-8BF1F4A55F79}" type="datetimeFigureOut">
               <a:rPr lang="en-US" smtClean="0"/>
-              <a:t>10/14/2022</a:t>
+              <a:t>10/19/2022</a:t>
             </a:fld>
             <a:endParaRPr lang="en-US" dirty="0"/>
           </a:p>
@@ -4791,7 +4792,7 @@
           <a:p>
             <a:fld id="{D37C2CC6-8D09-460E-A36A-8BF1F4A55F79}" type="datetimeFigureOut">
               <a:rPr lang="en-US" smtClean="0"/>
-              <a:t>10/14/2022</a:t>
+              <a:t>10/19/2022</a:t>
             </a:fld>
             <a:endParaRPr lang="en-US" dirty="0"/>
           </a:p>
@@ -5102,7 +5103,7 @@
           <a:p>
             <a:fld id="{D37C2CC6-8D09-460E-A36A-8BF1F4A55F79}" type="datetimeFigureOut">
               <a:rPr lang="en-US" smtClean="0"/>
-              <a:t>10/14/2022</a:t>
+              <a:t>10/19/2022</a:t>
             </a:fld>
             <a:endParaRPr lang="en-US" dirty="0"/>
           </a:p>
@@ -5390,7 +5391,7 @@
           <a:p>
             <a:fld id="{D37C2CC6-8D09-460E-A36A-8BF1F4A55F79}" type="datetimeFigureOut">
               <a:rPr lang="en-US" smtClean="0"/>
-              <a:t>10/14/2022</a:t>
+              <a:t>10/19/2022</a:t>
             </a:fld>
             <a:endParaRPr lang="en-US" dirty="0"/>
           </a:p>
@@ -5467,9 +5468,14 @@
 <p:sldMaster xmlns:a="http://schemas.openxmlformats.org/drawingml/2006/main" xmlns:r="http://schemas.openxmlformats.org/officeDocument/2006/relationships" xmlns:p="http://schemas.openxmlformats.org/presentationml/2006/main">
   <p:cSld>
     <p:bg>
-      <p:bgRef idx="1001">
-        <a:schemeClr val="bg1"/>
-      </p:bgRef>
+      <p:bgPr>
+        <a:solidFill>
+          <a:schemeClr val="bg1">
+            <a:lumMod val="95000"/>
+          </a:schemeClr>
+        </a:solidFill>
+        <a:effectLst/>
+      </p:bgPr>
     </p:bg>
     <p:spTree>
       <p:nvGrpSpPr>
@@ -5631,7 +5637,7 @@
           <a:p>
             <a:fld id="{D37C2CC6-8D09-460E-A36A-8BF1F4A55F79}" type="datetimeFigureOut">
               <a:rPr lang="en-US" smtClean="0"/>
-              <a:t>10/14/2022</a:t>
+              <a:t>10/19/2022</a:t>
             </a:fld>
             <a:endParaRPr lang="en-US" dirty="0"/>
           </a:p>
@@ -6034,17 +6040,6 @@
 <file path=ppt/slides/slide1.xml><?xml version="1.0" encoding="utf-8"?>
 <p:sld xmlns:a="http://schemas.openxmlformats.org/drawingml/2006/main" xmlns:r="http://schemas.openxmlformats.org/officeDocument/2006/relationships" xmlns:p="http://schemas.openxmlformats.org/presentationml/2006/main">
   <p:cSld>
-    <p:bg>
-      <p:bgPr>
-        <a:solidFill>
-          <a:schemeClr val="bg2">
-            <a:lumMod val="20000"/>
-            <a:lumOff val="80000"/>
-          </a:schemeClr>
-        </a:solidFill>
-        <a:effectLst/>
-      </p:bgPr>
-    </p:bg>
     <p:spTree>
       <p:nvGrpSpPr>
         <p:cNvPr id="1" name=""/>
@@ -7521,17 +7516,6 @@
 <file path=ppt/slides/slide16.xml><?xml version="1.0" encoding="utf-8"?>
 <p:sld xmlns:a="http://schemas.openxmlformats.org/drawingml/2006/main" xmlns:r="http://schemas.openxmlformats.org/officeDocument/2006/relationships" xmlns:p="http://schemas.openxmlformats.org/presentationml/2006/main">
   <p:cSld>
-    <p:bg>
-      <p:bgPr>
-        <a:solidFill>
-          <a:schemeClr val="bg2">
-            <a:lumMod val="20000"/>
-            <a:lumOff val="80000"/>
-          </a:schemeClr>
-        </a:solidFill>
-        <a:effectLst/>
-      </p:bgPr>
-    </p:bg>
     <p:spTree>
       <p:nvGrpSpPr>
         <p:cNvPr id="1" name=""/>
@@ -8214,13 +8198,13 @@
           <p:nvPr>
             <p:extLst>
               <p:ext uri="{D42A27DB-BD31-4B8C-83A1-F6EECF244321}">
-                <p14:modId xmlns:p14="http://schemas.microsoft.com/office/powerpoint/2010/main" val="490486658"/>
+                <p14:modId xmlns:p14="http://schemas.microsoft.com/office/powerpoint/2010/main" val="3414263220"/>
               </p:ext>
             </p:extLst>
           </p:nvPr>
         </p:nvGraphicFramePr>
         <p:xfrm>
-          <a:off x="758367" y="3183257"/>
+          <a:off x="631065" y="2963142"/>
           <a:ext cx="7714446" cy="3411900"/>
         </p:xfrm>
         <a:graphic>
@@ -8466,7 +8450,7 @@
           <a:p>
             <a:r>
               <a:rPr lang="en-AU" sz="2800"/>
-              <a:t>Males in 60 plus BMI</a:t>
+              <a:t>Males in 60 plus, BMI</a:t>
             </a:r>
             <a:endParaRPr lang="en-US" sz="2800" dirty="0"/>
           </a:p>
@@ -9118,6 +9102,82 @@
               <a:t> group</a:t>
             </a:r>
             <a:endParaRPr lang="en-US" sz="1600" dirty="0">
+              <a:latin typeface="Arial" panose="020B0604020202020204" pitchFamily="34" charset="0"/>
+              <a:cs typeface="Arial" panose="020B0604020202020204" pitchFamily="34" charset="0"/>
+            </a:endParaRPr>
+          </a:p>
+        </p:txBody>
+      </p:sp>
+      <p:sp>
+        <p:nvSpPr>
+          <p:cNvPr id="4" name="Multiplication Sign 3">
+            <a:extLst>
+              <a:ext uri="{FF2B5EF4-FFF2-40B4-BE49-F238E27FC236}">
+                <a16:creationId xmlns:a16="http://schemas.microsoft.com/office/drawing/2014/main" id="{1B0C0C93-410D-30D4-8787-AA0DBA4D37E9}"/>
+              </a:ext>
+            </a:extLst>
+          </p:cNvPr>
+          <p:cNvSpPr/>
+          <p:nvPr/>
+        </p:nvSpPr>
+        <p:spPr>
+          <a:xfrm>
+            <a:off x="2907563" y="624756"/>
+            <a:ext cx="7339680" cy="5970401"/>
+          </a:xfrm>
+          <a:prstGeom prst="mathMultiply">
+            <a:avLst>
+              <a:gd name="adj1" fmla="val 16528"/>
+            </a:avLst>
+          </a:prstGeom>
+          <a:solidFill>
+            <a:schemeClr val="accent3">
+              <a:lumMod val="60000"/>
+              <a:lumOff val="40000"/>
+            </a:schemeClr>
+          </a:solidFill>
+          <a:ln w="28575">
+            <a:solidFill>
+              <a:schemeClr val="bg1">
+                <a:lumMod val="65000"/>
+              </a:schemeClr>
+            </a:solidFill>
+          </a:ln>
+        </p:spPr>
+        <p:style>
+          <a:lnRef idx="2">
+            <a:schemeClr val="dk1"/>
+          </a:lnRef>
+          <a:fillRef idx="1">
+            <a:schemeClr val="lt1"/>
+          </a:fillRef>
+          <a:effectRef idx="0">
+            <a:schemeClr val="dk1"/>
+          </a:effectRef>
+          <a:fontRef idx="minor">
+            <a:schemeClr val="dk1"/>
+          </a:fontRef>
+        </p:style>
+        <p:txBody>
+          <a:bodyPr rtlCol="0" anchor="ctr"/>
+          <a:lstStyle/>
+          <a:p>
+            <a:pPr algn="l"/>
+            <a:r>
+              <a:rPr lang="en-US" sz="1600">
+                <a:solidFill>
+                  <a:srgbClr val="000000"/>
+                </a:solidFill>
+                <a:latin typeface="Arial" panose="020B0604020202020204" pitchFamily="34" charset="0"/>
+                <a:cs typeface="Arial" panose="020B0604020202020204" pitchFamily="34" charset="0"/>
+              </a:rPr>
+              <a:t>Order of levels of GLU_index is incorrect!!</a:t>
+            </a:r>
+            <a:endParaRPr lang="en-US" sz="1600" i="0" u="none" strike="noStrike">
+              <a:solidFill>
+                <a:srgbClr val="000000"/>
+              </a:solidFill>
+              <a:effectLst/>
               <a:latin typeface="Arial" panose="020B0604020202020204" pitchFamily="34" charset="0"/>
               <a:cs typeface="Arial" panose="020B0604020202020204" pitchFamily="34" charset="0"/>
             </a:endParaRPr>
@@ -9184,7 +9244,7 @@
           <a:p>
             <a:r>
               <a:rPr lang="en-AU" sz="2800"/>
-              <a:t>Males in 60 plus KCAL</a:t>
+              <a:t>Males in 60 plus, KCAL</a:t>
             </a:r>
             <a:endParaRPr lang="en-US" sz="2800" dirty="0"/>
           </a:p>
@@ -9245,7 +9305,7 @@
                 <a:latin typeface="Arial" panose="020B0604020202020204" pitchFamily="34" charset="0"/>
                 <a:cs typeface="Arial" panose="020B0604020202020204" pitchFamily="34" charset="0"/>
               </a:rPr>
-              <a:t>Calorie intake of Normal, Prediabetic, and Diabetic groups are not different... </a:t>
+              <a:t>Calorie intake of Normal, Prediabetic, and Diabetic groups are not different. </a:t>
             </a:r>
             <a:endParaRPr lang="en-US" sz="1600" dirty="0">
               <a:latin typeface="Arial" panose="020B0604020202020204" pitchFamily="34" charset="0"/>
@@ -9384,7 +9444,7 @@
         <p:spPr>
           <a:xfrm>
             <a:off x="375138" y="262843"/>
-            <a:ext cx="4818185" cy="1073588"/>
+            <a:ext cx="9184498" cy="1073588"/>
           </a:xfrm>
         </p:spPr>
         <p:txBody>
@@ -9395,82 +9455,9 @@
           <a:p>
             <a:r>
               <a:rPr lang="en-AU" sz="2800"/>
-              <a:t>Male in 60plus Lv2 </a:t>
-            </a:r>
-            <a:r>
-              <a:rPr lang="en-AU" sz="2400"/>
-              <a:t>WEIGHTED</a:t>
+              <a:t>Mistake in 40_ordination_NHANES_xxxx found!!</a:t>
             </a:r>
             <a:endParaRPr lang="en-US" sz="2800" dirty="0"/>
-          </a:p>
-        </p:txBody>
-      </p:sp>
-      <p:sp>
-        <p:nvSpPr>
-          <p:cNvPr id="3" name="TextBox 2">
-            <a:extLst>
-              <a:ext uri="{FF2B5EF4-FFF2-40B4-BE49-F238E27FC236}">
-                <a16:creationId xmlns:a16="http://schemas.microsoft.com/office/drawing/2014/main" id="{E29CD46D-6078-AC2F-CB5A-35C8DE794A2E}"/>
-              </a:ext>
-            </a:extLst>
-          </p:cNvPr>
-          <p:cNvSpPr txBox="1"/>
-          <p:nvPr/>
-        </p:nvSpPr>
-        <p:spPr>
-          <a:xfrm>
-            <a:off x="80171" y="5521568"/>
-            <a:ext cx="4818185" cy="584775"/>
-          </a:xfrm>
-          <a:prstGeom prst="rect">
-            <a:avLst/>
-          </a:prstGeom>
-          <a:noFill/>
-        </p:spPr>
-        <p:txBody>
-          <a:bodyPr wrap="square" rtlCol="0">
-            <a:spAutoFit/>
-          </a:bodyPr>
-          <a:lstStyle/>
-          <a:p>
-            <a:r>
-              <a:rPr lang="en-US" sz="1600">
-                <a:solidFill>
-                  <a:schemeClr val="tx1">
-                    <a:lumMod val="85000"/>
-                    <a:lumOff val="15000"/>
-                  </a:schemeClr>
-                </a:solidFill>
-                <a:latin typeface="Arial" panose="020B0604020202020204" pitchFamily="34" charset="0"/>
-                <a:cs typeface="Arial" panose="020B0604020202020204" pitchFamily="34" charset="0"/>
-              </a:rPr>
-              <a:t>vegan::permutest: p-value ~. Assumption OK.</a:t>
-            </a:r>
-          </a:p>
-          <a:p>
-            <a:r>
-              <a:rPr lang="en-US" sz="1600">
-                <a:solidFill>
-                  <a:schemeClr val="tx1">
-                    <a:lumMod val="85000"/>
-                    <a:lumOff val="15000"/>
-                  </a:schemeClr>
-                </a:solidFill>
-                <a:latin typeface="Arial" panose="020B0604020202020204" pitchFamily="34" charset="0"/>
-                <a:cs typeface="Arial" panose="020B0604020202020204" pitchFamily="34" charset="0"/>
-              </a:rPr>
-              <a:t>vegan::adonis: p-value. Groups are.  </a:t>
-            </a:r>
-            <a:endParaRPr lang="en-US" sz="1600" dirty="0">
-              <a:solidFill>
-                <a:schemeClr val="tx1">
-                  <a:lumMod val="85000"/>
-                  <a:lumOff val="15000"/>
-                </a:schemeClr>
-              </a:solidFill>
-              <a:latin typeface="Arial" panose="020B0604020202020204" pitchFamily="34" charset="0"/>
-              <a:cs typeface="Arial" panose="020B0604020202020204" pitchFamily="34" charset="0"/>
-            </a:endParaRPr>
           </a:p>
         </p:txBody>
       </p:sp>
@@ -9488,11 +9475,13 @@
         </p:nvSpPr>
         <p:spPr>
           <a:xfrm>
-            <a:off x="9253305" y="3729296"/>
-            <a:ext cx="2642995" cy="1592561"/>
+            <a:off x="6641648" y="2278316"/>
+            <a:ext cx="2642995" cy="1150684"/>
           </a:xfrm>
           <a:prstGeom prst="roundRect">
-            <a:avLst/>
+            <a:avLst>
+              <a:gd name="adj" fmla="val 13722"/>
+            </a:avLst>
           </a:prstGeom>
           <a:solidFill>
             <a:schemeClr val="bg1"/>
@@ -9529,19 +9518,158 @@
                 <a:latin typeface="Arial" panose="020B0604020202020204" pitchFamily="34" charset="0"/>
                 <a:cs typeface="Arial" panose="020B0604020202020204" pitchFamily="34" charset="0"/>
               </a:rPr>
-              <a:t>Axes 1&amp;2</a:t>
+              <a:t>This must be </a:t>
+            </a:r>
+            <a:r>
+              <a:rPr lang="en-US" sz="1600" b="1">
+                <a:solidFill>
+                  <a:srgbClr val="0070C0"/>
+                </a:solidFill>
+                <a:latin typeface="Arial" panose="020B0604020202020204" pitchFamily="34" charset="0"/>
+                <a:cs typeface="Arial" panose="020B0604020202020204" pitchFamily="34" charset="0"/>
+              </a:rPr>
+              <a:t>levels</a:t>
+            </a:r>
+            <a:r>
+              <a:rPr lang="en-US" sz="1600">
+                <a:latin typeface="Arial" panose="020B0604020202020204" pitchFamily="34" charset="0"/>
+                <a:cs typeface="Arial" panose="020B0604020202020204" pitchFamily="34" charset="0"/>
+              </a:rPr>
+              <a:t>, not </a:t>
+            </a:r>
+            <a:r>
+              <a:rPr lang="en-US" sz="1600" b="1">
+                <a:solidFill>
+                  <a:srgbClr val="FF0000"/>
+                </a:solidFill>
+                <a:latin typeface="Arial" panose="020B0604020202020204" pitchFamily="34" charset="0"/>
+                <a:cs typeface="Arial" panose="020B0604020202020204" pitchFamily="34" charset="0"/>
+              </a:rPr>
+              <a:t>labels</a:t>
+            </a:r>
+            <a:r>
+              <a:rPr lang="en-US" sz="1600">
+                <a:latin typeface="Arial" panose="020B0604020202020204" pitchFamily="34" charset="0"/>
+                <a:cs typeface="Arial" panose="020B0604020202020204" pitchFamily="34" charset="0"/>
+              </a:rPr>
+              <a:t>!!!!</a:t>
             </a:r>
             <a:endParaRPr lang="en-US" sz="1600" dirty="0">
               <a:latin typeface="Arial" panose="020B0604020202020204" pitchFamily="34" charset="0"/>
               <a:cs typeface="Arial" panose="020B0604020202020204" pitchFamily="34" charset="0"/>
             </a:endParaRPr>
+          </a:p>
+        </p:txBody>
+      </p:sp>
+      <p:sp>
+        <p:nvSpPr>
+          <p:cNvPr id="5" name="TextBox 4">
+            <a:extLst>
+              <a:ext uri="{FF2B5EF4-FFF2-40B4-BE49-F238E27FC236}">
+                <a16:creationId xmlns:a16="http://schemas.microsoft.com/office/drawing/2014/main" id="{691DD2D1-AF85-2D9F-7941-D99DA8F027E7}"/>
+              </a:ext>
+            </a:extLst>
+          </p:cNvPr>
+          <p:cNvSpPr txBox="1"/>
+          <p:nvPr/>
+        </p:nvSpPr>
+        <p:spPr>
+          <a:xfrm>
+            <a:off x="694250" y="1564549"/>
+            <a:ext cx="10492154" cy="830997"/>
+          </a:xfrm>
+          <a:prstGeom prst="rect">
+            <a:avLst/>
+          </a:prstGeom>
+          <a:noFill/>
+        </p:spPr>
+        <p:txBody>
+          <a:bodyPr wrap="square">
+            <a:spAutoFit/>
+          </a:bodyPr>
+          <a:lstStyle/>
+          <a:p>
+            <a:r>
+              <a:rPr lang="en-US" sz="1600">
+                <a:latin typeface="Consolas" panose="020B0609020204030204" pitchFamily="49" charset="0"/>
+              </a:rPr>
+              <a:t># Convert the GLU_index as a factor to plot it in order.</a:t>
+            </a:r>
+          </a:p>
+          <a:p>
+            <a:r>
+              <a:rPr lang="en-US" sz="1600">
+                <a:latin typeface="Consolas" panose="020B0609020204030204" pitchFamily="49" charset="0"/>
+              </a:rPr>
+              <a:t>  loaded_glu_u$GLU_index &lt;- factor(loaded_glu_u$GLU_index, </a:t>
+            </a:r>
+            <a:r>
+              <a:rPr lang="en-US" sz="1600" b="1" strike="sngStrike">
+                <a:solidFill>
+                  <a:srgbClr val="FF0000"/>
+                </a:solidFill>
+                <a:latin typeface="Consolas" panose="020B0609020204030204" pitchFamily="49" charset="0"/>
+              </a:rPr>
+              <a:t>labels</a:t>
+            </a:r>
+            <a:r>
+              <a:rPr lang="en-US" sz="1600">
+                <a:latin typeface="Consolas" panose="020B0609020204030204" pitchFamily="49" charset="0"/>
+              </a:rPr>
+              <a:t>= c("Normal", "Prediabetic", "Diabetic"))</a:t>
+            </a:r>
+          </a:p>
+        </p:txBody>
+      </p:sp>
+      <p:sp>
+        <p:nvSpPr>
+          <p:cNvPr id="6" name="TextBox 5">
+            <a:extLst>
+              <a:ext uri="{FF2B5EF4-FFF2-40B4-BE49-F238E27FC236}">
+                <a16:creationId xmlns:a16="http://schemas.microsoft.com/office/drawing/2014/main" id="{C356DC44-FABD-7449-4C65-3D68BBA30449}"/>
+              </a:ext>
+            </a:extLst>
+          </p:cNvPr>
+          <p:cNvSpPr txBox="1"/>
+          <p:nvPr/>
+        </p:nvSpPr>
+        <p:spPr>
+          <a:xfrm>
+            <a:off x="694250" y="4046956"/>
+            <a:ext cx="10492154" cy="1077218"/>
+          </a:xfrm>
+          <a:prstGeom prst="rect">
+            <a:avLst/>
+          </a:prstGeom>
+          <a:noFill/>
+        </p:spPr>
+        <p:txBody>
+          <a:bodyPr wrap="square">
+            <a:spAutoFit/>
+          </a:bodyPr>
+          <a:lstStyle/>
+          <a:p>
+            <a:r>
+              <a:rPr lang="en-US" sz="1600">
+                <a:latin typeface="Consolas" panose="020B0609020204030204" pitchFamily="49" charset="0"/>
+              </a:rPr>
+              <a:t># Change the plot colors so that new figures with correct levels can be distinguished from the incorrect ones…</a:t>
+            </a:r>
+          </a:p>
+          <a:p>
+            <a:r>
+              <a:rPr lang="en-US" sz="1600">
+                <a:latin typeface="Consolas" panose="020B0609020204030204" pitchFamily="49" charset="0"/>
+              </a:rPr>
+              <a:t>colors c("turquoise2", "goldenrod3", "mediumvioletred“) --&gt; replaced with c("steelblue3", "gold3", "hotpink“)</a:t>
+            </a:r>
           </a:p>
         </p:txBody>
       </p:sp>
     </p:spTree>
     <p:extLst>
       <p:ext uri="{BB962C8B-B14F-4D97-AF65-F5344CB8AC3E}">
-        <p14:creationId xmlns:p14="http://schemas.microsoft.com/office/powerpoint/2010/main" val="3261935382"/>
+        <p14:creationId xmlns:p14="http://schemas.microsoft.com/office/powerpoint/2010/main" val="676462966"/>
       </p:ext>
     </p:extLst>
   </p:cSld>
@@ -9598,11 +9726,11 @@
           <a:p>
             <a:r>
               <a:rPr lang="en-AU" sz="2800"/>
-              <a:t>Male in 60plus Lv2 </a:t>
+              <a:t>Male in 60plus Lv3 </a:t>
             </a:r>
             <a:r>
               <a:rPr lang="en-AU" sz="2400"/>
-              <a:t>UNweighted</a:t>
+              <a:t>WEIGHTED</a:t>
             </a:r>
             <a:endParaRPr lang="en-US" sz="2800" dirty="0"/>
           </a:p>
@@ -9610,10 +9738,10 @@
       </p:sp>
       <p:sp>
         <p:nvSpPr>
-          <p:cNvPr id="3" name="TextBox 2">
-            <a:extLst>
-              <a:ext uri="{FF2B5EF4-FFF2-40B4-BE49-F238E27FC236}">
-                <a16:creationId xmlns:a16="http://schemas.microsoft.com/office/drawing/2014/main" id="{E29CD46D-6078-AC2F-CB5A-35C8DE794A2E}"/>
+          <p:cNvPr id="4" name="TextBox 3">
+            <a:extLst>
+              <a:ext uri="{FF2B5EF4-FFF2-40B4-BE49-F238E27FC236}">
+                <a16:creationId xmlns:a16="http://schemas.microsoft.com/office/drawing/2014/main" id="{C7F634AC-AD7A-0B59-4163-7BDF4E651ED8}"/>
               </a:ext>
             </a:extLst>
           </p:cNvPr>
@@ -9622,8 +9750,8 @@
         </p:nvSpPr>
         <p:spPr>
           <a:xfrm>
-            <a:off x="80171" y="5521568"/>
-            <a:ext cx="4818185" cy="584775"/>
+            <a:off x="232571" y="5673968"/>
+            <a:ext cx="4818185" cy="830997"/>
           </a:xfrm>
           <a:prstGeom prst="rect">
             <a:avLst/>
@@ -9647,7 +9775,7 @@
                 <a:latin typeface="Arial" panose="020B0604020202020204" pitchFamily="34" charset="0"/>
                 <a:cs typeface="Arial" panose="020B0604020202020204" pitchFamily="34" charset="0"/>
               </a:rPr>
-              <a:t>vegan::permutest: p-value ~. Assumption OK.</a:t>
+              <a:t>vegan::permutest: p-value ~0.18. Assumption OK.</a:t>
             </a:r>
           </a:p>
           <a:p>
@@ -9662,7 +9790,7 @@
                 <a:latin typeface="Arial" panose="020B0604020202020204" pitchFamily="34" charset="0"/>
                 <a:cs typeface="Arial" panose="020B0604020202020204" pitchFamily="34" charset="0"/>
               </a:rPr>
-              <a:t>vegan::adonis: p-value. Groups are.  </a:t>
+              <a:t>vegan::adonis: p-value 0.06. Groups are borderline but not different.  </a:t>
             </a:r>
             <a:endParaRPr lang="en-US" sz="1600" dirty="0">
               <a:solidFill>
@@ -9677,64 +9805,198 @@
           </a:p>
         </p:txBody>
       </p:sp>
+      <p:pic>
+        <p:nvPicPr>
+          <p:cNvPr id="7" name="Picture 6" descr="Chart, scatter chart, bubble chart&#10;&#10;Description automatically generated">
+            <a:extLst>
+              <a:ext uri="{FF2B5EF4-FFF2-40B4-BE49-F238E27FC236}">
+                <a16:creationId xmlns:a16="http://schemas.microsoft.com/office/drawing/2014/main" id="{BB573E2C-A836-2EFC-5B19-67CBCBA9B0D6}"/>
+              </a:ext>
+            </a:extLst>
+          </p:cNvPr>
+          <p:cNvPicPr>
+            <a:picLocks noChangeAspect="1"/>
+          </p:cNvPicPr>
+          <p:nvPr/>
+        </p:nvPicPr>
+        <p:blipFill>
+          <a:blip r:embed="rId2">
+            <a:extLst>
+              <a:ext uri="{28A0092B-C50C-407E-A947-70E740481C1C}">
+                <a14:useLocalDpi xmlns:a14="http://schemas.microsoft.com/office/drawing/2010/main" val="0"/>
+              </a:ext>
+            </a:extLst>
+          </a:blip>
+          <a:stretch>
+            <a:fillRect/>
+          </a:stretch>
+        </p:blipFill>
+        <p:spPr>
+          <a:xfrm>
+            <a:off x="5193323" y="3526746"/>
+            <a:ext cx="3914827" cy="3075936"/>
+          </a:xfrm>
+          <a:prstGeom prst="rect">
+            <a:avLst/>
+          </a:prstGeom>
+        </p:spPr>
+      </p:pic>
+      <p:pic>
+        <p:nvPicPr>
+          <p:cNvPr id="11" name="Picture 10" descr="Chart, scatter chart&#10;&#10;Description automatically generated">
+            <a:extLst>
+              <a:ext uri="{FF2B5EF4-FFF2-40B4-BE49-F238E27FC236}">
+                <a16:creationId xmlns:a16="http://schemas.microsoft.com/office/drawing/2014/main" id="{30DB13DC-3339-D7D8-F827-19B6F52DF182}"/>
+              </a:ext>
+            </a:extLst>
+          </p:cNvPr>
+          <p:cNvPicPr>
+            <a:picLocks noChangeAspect="1"/>
+          </p:cNvPicPr>
+          <p:nvPr/>
+        </p:nvPicPr>
+        <p:blipFill>
+          <a:blip r:embed="rId3">
+            <a:extLst>
+              <a:ext uri="{28A0092B-C50C-407E-A947-70E740481C1C}">
+                <a14:useLocalDpi xmlns:a14="http://schemas.microsoft.com/office/drawing/2010/main" val="0"/>
+              </a:ext>
+            </a:extLst>
+          </a:blip>
+          <a:stretch>
+            <a:fillRect/>
+          </a:stretch>
+        </p:blipFill>
+        <p:spPr>
+          <a:xfrm>
+            <a:off x="5193322" y="175593"/>
+            <a:ext cx="3914827" cy="3075936"/>
+          </a:xfrm>
+          <a:prstGeom prst="rect">
+            <a:avLst/>
+          </a:prstGeom>
+        </p:spPr>
+      </p:pic>
+      <p:pic>
+        <p:nvPicPr>
+          <p:cNvPr id="13" name="Picture 12" descr="Chart, diagram&#10;&#10;Description automatically generated with medium confidence">
+            <a:extLst>
+              <a:ext uri="{FF2B5EF4-FFF2-40B4-BE49-F238E27FC236}">
+                <a16:creationId xmlns:a16="http://schemas.microsoft.com/office/drawing/2014/main" id="{6636BECB-56D5-B5BB-C1FF-1D4C32F0D958}"/>
+              </a:ext>
+            </a:extLst>
+          </p:cNvPr>
+          <p:cNvPicPr>
+            <a:picLocks noChangeAspect="1"/>
+          </p:cNvPicPr>
+          <p:nvPr/>
+        </p:nvPicPr>
+        <p:blipFill>
+          <a:blip r:embed="rId4">
+            <a:extLst>
+              <a:ext uri="{28A0092B-C50C-407E-A947-70E740481C1C}">
+                <a14:useLocalDpi xmlns:a14="http://schemas.microsoft.com/office/drawing/2010/main" val="0"/>
+              </a:ext>
+            </a:extLst>
+          </a:blip>
+          <a:stretch>
+            <a:fillRect/>
+          </a:stretch>
+        </p:blipFill>
+        <p:spPr>
+          <a:xfrm>
+            <a:off x="148364" y="1790750"/>
+            <a:ext cx="4419600" cy="3472543"/>
+          </a:xfrm>
+          <a:prstGeom prst="rect">
+            <a:avLst/>
+          </a:prstGeom>
+        </p:spPr>
+      </p:pic>
+      <p:pic>
+        <p:nvPicPr>
+          <p:cNvPr id="9" name="Picture 8" descr="Chart, scatter chart&#10;&#10;Description automatically generated">
+            <a:extLst>
+              <a:ext uri="{FF2B5EF4-FFF2-40B4-BE49-F238E27FC236}">
+                <a16:creationId xmlns:a16="http://schemas.microsoft.com/office/drawing/2014/main" id="{A71A90A1-6D2B-3A2F-9130-BDBE6ECDC927}"/>
+              </a:ext>
+            </a:extLst>
+          </p:cNvPr>
+          <p:cNvPicPr>
+            <a:picLocks noChangeAspect="1"/>
+          </p:cNvPicPr>
+          <p:nvPr/>
+        </p:nvPicPr>
+        <p:blipFill>
+          <a:blip r:embed="rId5">
+            <a:extLst>
+              <a:ext uri="{28A0092B-C50C-407E-A947-70E740481C1C}">
+                <a14:useLocalDpi xmlns:a14="http://schemas.microsoft.com/office/drawing/2010/main" val="0"/>
+              </a:ext>
+            </a:extLst>
+          </a:blip>
+          <a:stretch>
+            <a:fillRect/>
+          </a:stretch>
+        </p:blipFill>
+        <p:spPr>
+          <a:xfrm>
+            <a:off x="8277173" y="174211"/>
+            <a:ext cx="3914827" cy="3075936"/>
+          </a:xfrm>
+          <a:prstGeom prst="rect">
+            <a:avLst/>
+          </a:prstGeom>
+        </p:spPr>
+      </p:pic>
       <p:sp>
         <p:nvSpPr>
-          <p:cNvPr id="20" name="Rectangle: Rounded Corners 19">
-            <a:extLst>
-              <a:ext uri="{FF2B5EF4-FFF2-40B4-BE49-F238E27FC236}">
-                <a16:creationId xmlns:a16="http://schemas.microsoft.com/office/drawing/2014/main" id="{7DD8CF00-AC29-B310-CDBF-074C3A73FCA4}"/>
-              </a:ext>
-            </a:extLst>
-          </p:cNvPr>
-          <p:cNvSpPr/>
+          <p:cNvPr id="14" name="TextBox 13">
+            <a:extLst>
+              <a:ext uri="{FF2B5EF4-FFF2-40B4-BE49-F238E27FC236}">
+                <a16:creationId xmlns:a16="http://schemas.microsoft.com/office/drawing/2014/main" id="{5556DDF9-31AA-F488-63FF-CCDD0EC9984B}"/>
+              </a:ext>
+            </a:extLst>
+          </p:cNvPr>
+          <p:cNvSpPr txBox="1"/>
           <p:nvPr/>
         </p:nvSpPr>
         <p:spPr>
           <a:xfrm>
-            <a:off x="9253305" y="3729296"/>
-            <a:ext cx="2642995" cy="1592561"/>
-          </a:xfrm>
-          <a:prstGeom prst="roundRect">
+            <a:off x="2045612" y="4466200"/>
+            <a:ext cx="1706991" cy="276999"/>
+          </a:xfrm>
+          <a:prstGeom prst="rect">
             <a:avLst/>
           </a:prstGeom>
-          <a:solidFill>
-            <a:schemeClr val="bg1"/>
-          </a:solidFill>
-          <a:ln w="28575">
-            <a:solidFill>
-              <a:schemeClr val="bg1">
-                <a:lumMod val="65000"/>
-              </a:schemeClr>
-            </a:solidFill>
-          </a:ln>
-        </p:spPr>
-        <p:style>
-          <a:lnRef idx="2">
-            <a:schemeClr val="dk1"/>
-          </a:lnRef>
-          <a:fillRef idx="1">
-            <a:schemeClr val="lt1"/>
-          </a:fillRef>
-          <a:effectRef idx="0">
-            <a:schemeClr val="dk1"/>
-          </a:effectRef>
-          <a:fontRef idx="minor">
-            <a:schemeClr val="dk1"/>
-          </a:fontRef>
-        </p:style>
+          <a:noFill/>
+        </p:spPr>
         <p:txBody>
-          <a:bodyPr rtlCol="0" anchor="ctr"/>
+          <a:bodyPr wrap="square" rtlCol="0">
+            <a:spAutoFit/>
+          </a:bodyPr>
           <a:lstStyle/>
           <a:p>
-            <a:pPr algn="ctr"/>
-            <a:r>
-              <a:rPr lang="en-US" sz="1600">
+            <a:r>
+              <a:rPr lang="en-US" sz="1200">
+                <a:solidFill>
+                  <a:schemeClr val="tx1">
+                    <a:lumMod val="85000"/>
+                    <a:lumOff val="15000"/>
+                  </a:schemeClr>
+                </a:solidFill>
                 <a:latin typeface="Arial" panose="020B0604020202020204" pitchFamily="34" charset="0"/>
                 <a:cs typeface="Arial" panose="020B0604020202020204" pitchFamily="34" charset="0"/>
               </a:rPr>
-              <a:t>Axes 1&amp;2</a:t>
+              <a:t>Conversion failed</a:t>
             </a:r>
             <a:endParaRPr lang="en-US" sz="1600" dirty="0">
+              <a:solidFill>
+                <a:schemeClr val="tx1">
+                  <a:lumMod val="85000"/>
+                  <a:lumOff val="15000"/>
+                </a:schemeClr>
+              </a:solidFill>
               <a:latin typeface="Arial" panose="020B0604020202020204" pitchFamily="34" charset="0"/>
               <a:cs typeface="Arial" panose="020B0604020202020204" pitchFamily="34" charset="0"/>
             </a:endParaRPr>
@@ -9744,7 +10006,7 @@
     </p:spTree>
     <p:extLst>
       <p:ext uri="{BB962C8B-B14F-4D97-AF65-F5344CB8AC3E}">
-        <p14:creationId xmlns:p14="http://schemas.microsoft.com/office/powerpoint/2010/main" val="2756569458"/>
+        <p14:creationId xmlns:p14="http://schemas.microsoft.com/office/powerpoint/2010/main" val="2879977788"/>
       </p:ext>
     </p:extLst>
   </p:cSld>
@@ -9805,78 +10067,9 @@
             </a:r>
             <a:r>
               <a:rPr lang="en-AU" sz="2400"/>
-              <a:t>WEIGHTED</a:t>
+              <a:t>UNweighted</a:t>
             </a:r>
             <a:endParaRPr lang="en-US" sz="2800" dirty="0"/>
-          </a:p>
-        </p:txBody>
-      </p:sp>
-      <p:sp>
-        <p:nvSpPr>
-          <p:cNvPr id="3" name="TextBox 2">
-            <a:extLst>
-              <a:ext uri="{FF2B5EF4-FFF2-40B4-BE49-F238E27FC236}">
-                <a16:creationId xmlns:a16="http://schemas.microsoft.com/office/drawing/2014/main" id="{E29CD46D-6078-AC2F-CB5A-35C8DE794A2E}"/>
-              </a:ext>
-            </a:extLst>
-          </p:cNvPr>
-          <p:cNvSpPr txBox="1"/>
-          <p:nvPr/>
-        </p:nvSpPr>
-        <p:spPr>
-          <a:xfrm>
-            <a:off x="80171" y="5521568"/>
-            <a:ext cx="4818185" cy="584775"/>
-          </a:xfrm>
-          <a:prstGeom prst="rect">
-            <a:avLst/>
-          </a:prstGeom>
-          <a:noFill/>
-        </p:spPr>
-        <p:txBody>
-          <a:bodyPr wrap="square" rtlCol="0">
-            <a:spAutoFit/>
-          </a:bodyPr>
-          <a:lstStyle/>
-          <a:p>
-            <a:r>
-              <a:rPr lang="en-US" sz="1600">
-                <a:solidFill>
-                  <a:schemeClr val="tx1">
-                    <a:lumMod val="85000"/>
-                    <a:lumOff val="15000"/>
-                  </a:schemeClr>
-                </a:solidFill>
-                <a:latin typeface="Arial" panose="020B0604020202020204" pitchFamily="34" charset="0"/>
-                <a:cs typeface="Arial" panose="020B0604020202020204" pitchFamily="34" charset="0"/>
-              </a:rPr>
-              <a:t>vegan::permutest: p-value ~. Assumption OK.</a:t>
-            </a:r>
-          </a:p>
-          <a:p>
-            <a:r>
-              <a:rPr lang="en-US" sz="1600">
-                <a:solidFill>
-                  <a:schemeClr val="tx1">
-                    <a:lumMod val="85000"/>
-                    <a:lumOff val="15000"/>
-                  </a:schemeClr>
-                </a:solidFill>
-                <a:latin typeface="Arial" panose="020B0604020202020204" pitchFamily="34" charset="0"/>
-                <a:cs typeface="Arial" panose="020B0604020202020204" pitchFamily="34" charset="0"/>
-              </a:rPr>
-              <a:t>vegan::adonis: p-value. Groups are.  </a:t>
-            </a:r>
-            <a:endParaRPr lang="en-US" sz="1600" dirty="0">
-              <a:solidFill>
-                <a:schemeClr val="tx1">
-                  <a:lumMod val="85000"/>
-                  <a:lumOff val="15000"/>
-                </a:schemeClr>
-              </a:solidFill>
-              <a:latin typeface="Arial" panose="020B0604020202020204" pitchFamily="34" charset="0"/>
-              <a:cs typeface="Arial" panose="020B0604020202020204" pitchFamily="34" charset="0"/>
-            </a:endParaRPr>
           </a:p>
         </p:txBody>
       </p:sp>
@@ -9944,10 +10137,223 @@
           </a:p>
         </p:txBody>
       </p:sp>
+      <p:sp>
+        <p:nvSpPr>
+          <p:cNvPr id="4" name="TextBox 3">
+            <a:extLst>
+              <a:ext uri="{FF2B5EF4-FFF2-40B4-BE49-F238E27FC236}">
+                <a16:creationId xmlns:a16="http://schemas.microsoft.com/office/drawing/2014/main" id="{2544FCFA-5CCB-01B5-5038-CA102F0E8DDE}"/>
+              </a:ext>
+            </a:extLst>
+          </p:cNvPr>
+          <p:cNvSpPr txBox="1"/>
+          <p:nvPr/>
+        </p:nvSpPr>
+        <p:spPr>
+          <a:xfrm>
+            <a:off x="232571" y="5673968"/>
+            <a:ext cx="4818185" cy="584775"/>
+          </a:xfrm>
+          <a:prstGeom prst="rect">
+            <a:avLst/>
+          </a:prstGeom>
+          <a:noFill/>
+        </p:spPr>
+        <p:txBody>
+          <a:bodyPr wrap="square" rtlCol="0">
+            <a:spAutoFit/>
+          </a:bodyPr>
+          <a:lstStyle/>
+          <a:p>
+            <a:r>
+              <a:rPr lang="en-US" sz="1600">
+                <a:solidFill>
+                  <a:schemeClr val="tx1">
+                    <a:lumMod val="85000"/>
+                    <a:lumOff val="15000"/>
+                  </a:schemeClr>
+                </a:solidFill>
+                <a:latin typeface="Arial" panose="020B0604020202020204" pitchFamily="34" charset="0"/>
+                <a:cs typeface="Arial" panose="020B0604020202020204" pitchFamily="34" charset="0"/>
+              </a:rPr>
+              <a:t>vegan::permutest: p-value ~0.839. Assumption OK.</a:t>
+            </a:r>
+          </a:p>
+          <a:p>
+            <a:r>
+              <a:rPr lang="en-US" sz="1600">
+                <a:solidFill>
+                  <a:schemeClr val="tx1">
+                    <a:lumMod val="85000"/>
+                    <a:lumOff val="15000"/>
+                  </a:schemeClr>
+                </a:solidFill>
+                <a:latin typeface="Arial" panose="020B0604020202020204" pitchFamily="34" charset="0"/>
+                <a:cs typeface="Arial" panose="020B0604020202020204" pitchFamily="34" charset="0"/>
+              </a:rPr>
+              <a:t>vegan::adonis: p-value:0.009. Groups are different.  </a:t>
+            </a:r>
+            <a:endParaRPr lang="en-US" sz="1600" dirty="0">
+              <a:solidFill>
+                <a:schemeClr val="tx1">
+                  <a:lumMod val="85000"/>
+                  <a:lumOff val="15000"/>
+                </a:schemeClr>
+              </a:solidFill>
+              <a:latin typeface="Arial" panose="020B0604020202020204" pitchFamily="34" charset="0"/>
+              <a:cs typeface="Arial" panose="020B0604020202020204" pitchFamily="34" charset="0"/>
+            </a:endParaRPr>
+          </a:p>
+        </p:txBody>
+      </p:sp>
+      <p:pic>
+        <p:nvPicPr>
+          <p:cNvPr id="6" name="Picture 5" descr="Chart, scatter chart&#10;&#10;Description automatically generated">
+            <a:extLst>
+              <a:ext uri="{FF2B5EF4-FFF2-40B4-BE49-F238E27FC236}">
+                <a16:creationId xmlns:a16="http://schemas.microsoft.com/office/drawing/2014/main" id="{610B52CC-1E54-4BBF-810A-0A96D9621401}"/>
+              </a:ext>
+            </a:extLst>
+          </p:cNvPr>
+          <p:cNvPicPr>
+            <a:picLocks noChangeAspect="1"/>
+          </p:cNvPicPr>
+          <p:nvPr/>
+        </p:nvPicPr>
+        <p:blipFill>
+          <a:blip r:embed="rId2">
+            <a:extLst>
+              <a:ext uri="{28A0092B-C50C-407E-A947-70E740481C1C}">
+                <a14:useLocalDpi xmlns:a14="http://schemas.microsoft.com/office/drawing/2010/main" val="0"/>
+              </a:ext>
+            </a:extLst>
+          </a:blip>
+          <a:stretch>
+            <a:fillRect/>
+          </a:stretch>
+        </p:blipFill>
+        <p:spPr>
+          <a:xfrm>
+            <a:off x="5153352" y="3578514"/>
+            <a:ext cx="3910423" cy="3072475"/>
+          </a:xfrm>
+          <a:prstGeom prst="rect">
+            <a:avLst/>
+          </a:prstGeom>
+        </p:spPr>
+      </p:pic>
+      <p:pic>
+        <p:nvPicPr>
+          <p:cNvPr id="10" name="Picture 9" descr="Chart, scatter chart&#10;&#10;Description automatically generated">
+            <a:extLst>
+              <a:ext uri="{FF2B5EF4-FFF2-40B4-BE49-F238E27FC236}">
+                <a16:creationId xmlns:a16="http://schemas.microsoft.com/office/drawing/2014/main" id="{0C96C3DC-3DAC-E290-FA85-AC2AA716505F}"/>
+              </a:ext>
+            </a:extLst>
+          </p:cNvPr>
+          <p:cNvPicPr>
+            <a:picLocks noChangeAspect="1"/>
+          </p:cNvPicPr>
+          <p:nvPr/>
+        </p:nvPicPr>
+        <p:blipFill>
+          <a:blip r:embed="rId3">
+            <a:extLst>
+              <a:ext uri="{28A0092B-C50C-407E-A947-70E740481C1C}">
+                <a14:useLocalDpi xmlns:a14="http://schemas.microsoft.com/office/drawing/2010/main" val="0"/>
+              </a:ext>
+            </a:extLst>
+          </a:blip>
+          <a:stretch>
+            <a:fillRect/>
+          </a:stretch>
+        </p:blipFill>
+        <p:spPr>
+          <a:xfrm>
+            <a:off x="5153352" y="359412"/>
+            <a:ext cx="3910423" cy="3072475"/>
+          </a:xfrm>
+          <a:prstGeom prst="rect">
+            <a:avLst/>
+          </a:prstGeom>
+        </p:spPr>
+      </p:pic>
+      <p:pic>
+        <p:nvPicPr>
+          <p:cNvPr id="8" name="Picture 7" descr="Chart, scatter chart&#10;&#10;Description automatically generated">
+            <a:extLst>
+              <a:ext uri="{FF2B5EF4-FFF2-40B4-BE49-F238E27FC236}">
+                <a16:creationId xmlns:a16="http://schemas.microsoft.com/office/drawing/2014/main" id="{171EA81E-71DA-B463-168C-D131E524C292}"/>
+              </a:ext>
+            </a:extLst>
+          </p:cNvPr>
+          <p:cNvPicPr>
+            <a:picLocks noChangeAspect="1"/>
+          </p:cNvPicPr>
+          <p:nvPr/>
+        </p:nvPicPr>
+        <p:blipFill>
+          <a:blip r:embed="rId4">
+            <a:extLst>
+              <a:ext uri="{28A0092B-C50C-407E-A947-70E740481C1C}">
+                <a14:useLocalDpi xmlns:a14="http://schemas.microsoft.com/office/drawing/2010/main" val="0"/>
+              </a:ext>
+            </a:extLst>
+          </a:blip>
+          <a:stretch>
+            <a:fillRect/>
+          </a:stretch>
+        </p:blipFill>
+        <p:spPr>
+          <a:xfrm>
+            <a:off x="8281577" y="359411"/>
+            <a:ext cx="3910423" cy="3072475"/>
+          </a:xfrm>
+          <a:prstGeom prst="rect">
+            <a:avLst/>
+          </a:prstGeom>
+        </p:spPr>
+      </p:pic>
+      <p:pic>
+        <p:nvPicPr>
+          <p:cNvPr id="12" name="Picture 11" descr="Chart, scatter chart&#10;&#10;Description automatically generated">
+            <a:extLst>
+              <a:ext uri="{FF2B5EF4-FFF2-40B4-BE49-F238E27FC236}">
+                <a16:creationId xmlns:a16="http://schemas.microsoft.com/office/drawing/2014/main" id="{BD6BA42B-1B50-8E8A-E119-D37C6D89D51F}"/>
+              </a:ext>
+            </a:extLst>
+          </p:cNvPr>
+          <p:cNvPicPr>
+            <a:picLocks noChangeAspect="1"/>
+          </p:cNvPicPr>
+          <p:nvPr/>
+        </p:nvPicPr>
+        <p:blipFill>
+          <a:blip r:embed="rId5">
+            <a:extLst>
+              <a:ext uri="{28A0092B-C50C-407E-A947-70E740481C1C}">
+                <a14:useLocalDpi xmlns:a14="http://schemas.microsoft.com/office/drawing/2010/main" val="0"/>
+              </a:ext>
+            </a:extLst>
+          </a:blip>
+          <a:stretch>
+            <a:fillRect/>
+          </a:stretch>
+        </p:blipFill>
+        <p:spPr>
+          <a:xfrm>
+            <a:off x="232571" y="1724139"/>
+            <a:ext cx="4125034" cy="3241098"/>
+          </a:xfrm>
+          <a:prstGeom prst="rect">
+            <a:avLst/>
+          </a:prstGeom>
+        </p:spPr>
+      </p:pic>
     </p:spTree>
     <p:extLst>
       <p:ext uri="{BB962C8B-B14F-4D97-AF65-F5344CB8AC3E}">
-        <p14:creationId xmlns:p14="http://schemas.microsoft.com/office/powerpoint/2010/main" val="676462966"/>
+        <p14:creationId xmlns:p14="http://schemas.microsoft.com/office/powerpoint/2010/main" val="3323109437"/>
       </p:ext>
     </p:extLst>
   </p:cSld>
@@ -10004,11 +10410,11 @@
           <a:p>
             <a:r>
               <a:rPr lang="en-AU" sz="2800"/>
-              <a:t>Male in 60plus Lv3 </a:t>
+              <a:t>Male in 60plus Lv2 </a:t>
             </a:r>
             <a:r>
               <a:rPr lang="en-AU" sz="2400"/>
-              <a:t>UNweighted</a:t>
+              <a:t>WEIGHTED</a:t>
             </a:r>
             <a:endParaRPr lang="en-US" sz="2800" dirty="0"/>
           </a:p>
@@ -10053,7 +10459,7 @@
                 <a:latin typeface="Arial" panose="020B0604020202020204" pitchFamily="34" charset="0"/>
                 <a:cs typeface="Arial" panose="020B0604020202020204" pitchFamily="34" charset="0"/>
               </a:rPr>
-              <a:t>vegan::permutest: p-value ~. Assumption OK.</a:t>
+              <a:t>vegan::permutest: p-value ~0.15. Assumption OK.</a:t>
             </a:r>
           </a:p>
           <a:p>
@@ -10068,7 +10474,7 @@
                 <a:latin typeface="Arial" panose="020B0604020202020204" pitchFamily="34" charset="0"/>
                 <a:cs typeface="Arial" panose="020B0604020202020204" pitchFamily="34" charset="0"/>
               </a:rPr>
-              <a:t>vegan::adonis: p-value. Groups are.  </a:t>
+              <a:t>vegan::adonis: p-value 0.04. Groups are different.  </a:t>
             </a:r>
             <a:endParaRPr lang="en-US" sz="1600" dirty="0">
               <a:solidFill>
@@ -10097,8 +10503,8 @@
         </p:nvSpPr>
         <p:spPr>
           <a:xfrm>
-            <a:off x="9253305" y="3729296"/>
-            <a:ext cx="2642995" cy="1592561"/>
+            <a:off x="9054549" y="3565153"/>
+            <a:ext cx="2801996" cy="1011114"/>
           </a:xfrm>
           <a:prstGeom prst="roundRect">
             <a:avLst/>
@@ -10138,9 +10544,207 @@
                 <a:latin typeface="Arial" panose="020B0604020202020204" pitchFamily="34" charset="0"/>
                 <a:cs typeface="Arial" panose="020B0604020202020204" pitchFamily="34" charset="0"/>
               </a:rPr>
-              <a:t>Axes 1&amp;2</a:t>
+              <a:t>In Axes 2&amp;3 and Axes2&amp;4, Normal subpopulations look distinct.</a:t>
             </a:r>
             <a:endParaRPr lang="en-US" sz="1600" dirty="0">
+              <a:latin typeface="Arial" panose="020B0604020202020204" pitchFamily="34" charset="0"/>
+              <a:cs typeface="Arial" panose="020B0604020202020204" pitchFamily="34" charset="0"/>
+            </a:endParaRPr>
+          </a:p>
+        </p:txBody>
+      </p:sp>
+      <p:pic>
+        <p:nvPicPr>
+          <p:cNvPr id="15" name="Picture 14" descr="Chart, diagram, scatter chart&#10;&#10;Description automatically generated">
+            <a:extLst>
+              <a:ext uri="{FF2B5EF4-FFF2-40B4-BE49-F238E27FC236}">
+                <a16:creationId xmlns:a16="http://schemas.microsoft.com/office/drawing/2014/main" id="{DC529580-223E-7D53-85A1-FFD418D910A9}"/>
+              </a:ext>
+            </a:extLst>
+          </p:cNvPr>
+          <p:cNvPicPr>
+            <a:picLocks noChangeAspect="1"/>
+          </p:cNvPicPr>
+          <p:nvPr/>
+        </p:nvPicPr>
+        <p:blipFill>
+          <a:blip r:embed="rId2">
+            <a:extLst>
+              <a:ext uri="{28A0092B-C50C-407E-A947-70E740481C1C}">
+                <a14:useLocalDpi xmlns:a14="http://schemas.microsoft.com/office/drawing/2010/main" val="0"/>
+              </a:ext>
+            </a:extLst>
+          </a:blip>
+          <a:stretch>
+            <a:fillRect/>
+          </a:stretch>
+        </p:blipFill>
+        <p:spPr>
+          <a:xfrm>
+            <a:off x="4850192" y="153512"/>
+            <a:ext cx="4038306" cy="3172955"/>
+          </a:xfrm>
+          <a:prstGeom prst="rect">
+            <a:avLst/>
+          </a:prstGeom>
+        </p:spPr>
+      </p:pic>
+      <p:pic>
+        <p:nvPicPr>
+          <p:cNvPr id="17" name="Picture 16" descr="Chart, diagram, scatter chart&#10;&#10;Description automatically generated">
+            <a:extLst>
+              <a:ext uri="{FF2B5EF4-FFF2-40B4-BE49-F238E27FC236}">
+                <a16:creationId xmlns:a16="http://schemas.microsoft.com/office/drawing/2014/main" id="{5BFB78DF-E595-E192-C1C0-1F7E2D733BF3}"/>
+              </a:ext>
+            </a:extLst>
+          </p:cNvPr>
+          <p:cNvPicPr>
+            <a:picLocks noChangeAspect="1"/>
+          </p:cNvPicPr>
+          <p:nvPr/>
+        </p:nvPicPr>
+        <p:blipFill>
+          <a:blip r:embed="rId3">
+            <a:extLst>
+              <a:ext uri="{28A0092B-C50C-407E-A947-70E740481C1C}">
+                <a14:useLocalDpi xmlns:a14="http://schemas.microsoft.com/office/drawing/2010/main" val="0"/>
+              </a:ext>
+            </a:extLst>
+          </a:blip>
+          <a:stretch>
+            <a:fillRect/>
+          </a:stretch>
+        </p:blipFill>
+        <p:spPr>
+          <a:xfrm>
+            <a:off x="80171" y="1848521"/>
+            <a:ext cx="4326238" cy="3399187"/>
+          </a:xfrm>
+          <a:prstGeom prst="rect">
+            <a:avLst/>
+          </a:prstGeom>
+        </p:spPr>
+      </p:pic>
+      <p:pic>
+        <p:nvPicPr>
+          <p:cNvPr id="19" name="Picture 18" descr="Chart, scatter chart&#10;&#10;Description automatically generated">
+            <a:extLst>
+              <a:ext uri="{FF2B5EF4-FFF2-40B4-BE49-F238E27FC236}">
+                <a16:creationId xmlns:a16="http://schemas.microsoft.com/office/drawing/2014/main" id="{1ADC8666-B1B1-3C9E-2E22-DBAA4A65A86F}"/>
+              </a:ext>
+            </a:extLst>
+          </p:cNvPr>
+          <p:cNvPicPr>
+            <a:picLocks noChangeAspect="1"/>
+          </p:cNvPicPr>
+          <p:nvPr/>
+        </p:nvPicPr>
+        <p:blipFill>
+          <a:blip r:embed="rId4">
+            <a:extLst>
+              <a:ext uri="{28A0092B-C50C-407E-A947-70E740481C1C}">
+                <a14:useLocalDpi xmlns:a14="http://schemas.microsoft.com/office/drawing/2010/main" val="0"/>
+              </a:ext>
+            </a:extLst>
+          </a:blip>
+          <a:stretch>
+            <a:fillRect/>
+          </a:stretch>
+        </p:blipFill>
+        <p:spPr>
+          <a:xfrm>
+            <a:off x="4850192" y="3531533"/>
+            <a:ext cx="4038306" cy="3172955"/>
+          </a:xfrm>
+          <a:prstGeom prst="rect">
+            <a:avLst/>
+          </a:prstGeom>
+        </p:spPr>
+      </p:pic>
+      <p:pic>
+        <p:nvPicPr>
+          <p:cNvPr id="22" name="Picture 21" descr="Chart, scatter chart&#10;&#10;Description automatically generated">
+            <a:extLst>
+              <a:ext uri="{FF2B5EF4-FFF2-40B4-BE49-F238E27FC236}">
+                <a16:creationId xmlns:a16="http://schemas.microsoft.com/office/drawing/2014/main" id="{1943136F-B0CD-3266-CC39-EF92CE7366DF}"/>
+              </a:ext>
+            </a:extLst>
+          </p:cNvPr>
+          <p:cNvPicPr>
+            <a:picLocks noChangeAspect="1"/>
+          </p:cNvPicPr>
+          <p:nvPr/>
+        </p:nvPicPr>
+        <p:blipFill>
+          <a:blip r:embed="rId5">
+            <a:extLst>
+              <a:ext uri="{28A0092B-C50C-407E-A947-70E740481C1C}">
+                <a14:useLocalDpi xmlns:a14="http://schemas.microsoft.com/office/drawing/2010/main" val="0"/>
+              </a:ext>
+            </a:extLst>
+          </a:blip>
+          <a:stretch>
+            <a:fillRect/>
+          </a:stretch>
+        </p:blipFill>
+        <p:spPr>
+          <a:xfrm>
+            <a:off x="8101051" y="153511"/>
+            <a:ext cx="4038306" cy="3172955"/>
+          </a:xfrm>
+          <a:prstGeom prst="rect">
+            <a:avLst/>
+          </a:prstGeom>
+        </p:spPr>
+      </p:pic>
+      <p:sp>
+        <p:nvSpPr>
+          <p:cNvPr id="13" name="TextBox 12">
+            <a:extLst>
+              <a:ext uri="{FF2B5EF4-FFF2-40B4-BE49-F238E27FC236}">
+                <a16:creationId xmlns:a16="http://schemas.microsoft.com/office/drawing/2014/main" id="{929D313D-EE40-F043-A52A-FA3CA683AF07}"/>
+              </a:ext>
+            </a:extLst>
+          </p:cNvPr>
+          <p:cNvSpPr txBox="1"/>
+          <p:nvPr/>
+        </p:nvSpPr>
+        <p:spPr>
+          <a:xfrm>
+            <a:off x="604518" y="4539301"/>
+            <a:ext cx="2522352" cy="276999"/>
+          </a:xfrm>
+          <a:prstGeom prst="rect">
+            <a:avLst/>
+          </a:prstGeom>
+          <a:noFill/>
+        </p:spPr>
+        <p:txBody>
+          <a:bodyPr wrap="square" rtlCol="0">
+            <a:spAutoFit/>
+          </a:bodyPr>
+          <a:lstStyle/>
+          <a:p>
+            <a:r>
+              <a:rPr lang="en-US" sz="1200">
+                <a:solidFill>
+                  <a:schemeClr val="tx1">
+                    <a:lumMod val="85000"/>
+                    <a:lumOff val="15000"/>
+                  </a:schemeClr>
+                </a:solidFill>
+                <a:latin typeface="Arial" panose="020B0604020202020204" pitchFamily="34" charset="0"/>
+                <a:cs typeface="Arial" panose="020B0604020202020204" pitchFamily="34" charset="0"/>
+              </a:rPr>
+              <a:t>Conversion failed</a:t>
+            </a:r>
+            <a:endParaRPr lang="en-US" sz="1600" dirty="0">
+              <a:solidFill>
+                <a:schemeClr val="tx1">
+                  <a:lumMod val="85000"/>
+                  <a:lumOff val="15000"/>
+                </a:schemeClr>
+              </a:solidFill>
               <a:latin typeface="Arial" panose="020B0604020202020204" pitchFamily="34" charset="0"/>
               <a:cs typeface="Arial" panose="020B0604020202020204" pitchFamily="34" charset="0"/>
             </a:endParaRPr>
@@ -10150,7 +10754,7 @@
     </p:spTree>
     <p:extLst>
       <p:ext uri="{BB962C8B-B14F-4D97-AF65-F5344CB8AC3E}">
-        <p14:creationId xmlns:p14="http://schemas.microsoft.com/office/powerpoint/2010/main" val="3323109437"/>
+        <p14:creationId xmlns:p14="http://schemas.microsoft.com/office/powerpoint/2010/main" val="3261935382"/>
       </p:ext>
     </p:extLst>
   </p:cSld>
@@ -10196,7 +10800,7 @@
         <p:spPr>
           <a:xfrm>
             <a:off x="375138" y="262843"/>
-            <a:ext cx="8717347" cy="1073588"/>
+            <a:ext cx="4818185" cy="1073588"/>
           </a:xfrm>
         </p:spPr>
         <p:txBody>
@@ -10207,7 +10811,11 @@
           <a:p>
             <a:r>
               <a:rPr lang="en-AU" sz="2800"/>
-              <a:t>Male in 60plus PCA test separation using adonis by feeding Euclidean distance matrix to the model.</a:t>
+              <a:t>Male in 60plus Lv2 </a:t>
+            </a:r>
+            <a:r>
+              <a:rPr lang="en-AU" sz="2400"/>
+              <a:t>UNweighted</a:t>
             </a:r>
             <a:endParaRPr lang="en-US" sz="2800" dirty="0"/>
           </a:p>
@@ -10252,7 +10860,7 @@
                 <a:latin typeface="Arial" panose="020B0604020202020204" pitchFamily="34" charset="0"/>
                 <a:cs typeface="Arial" panose="020B0604020202020204" pitchFamily="34" charset="0"/>
               </a:rPr>
-              <a:t>vegan::permutest: p-value ~. Assumption OK.</a:t>
+              <a:t>vegan::permutest: p-value ~0.8. Assumption OK.</a:t>
             </a:r>
           </a:p>
           <a:p>
@@ -10267,7 +10875,7 @@
                 <a:latin typeface="Arial" panose="020B0604020202020204" pitchFamily="34" charset="0"/>
                 <a:cs typeface="Arial" panose="020B0604020202020204" pitchFamily="34" charset="0"/>
               </a:rPr>
-              <a:t>vegan::adonis: p-value. Groups are.  </a:t>
+              <a:t>vegan::adonis: p-value:0.013. Groups are different.  </a:t>
             </a:r>
             <a:endParaRPr lang="en-US" sz="1600" dirty="0">
               <a:solidFill>
@@ -10346,6 +10954,349 @@
           </a:p>
         </p:txBody>
       </p:sp>
+      <p:pic>
+        <p:nvPicPr>
+          <p:cNvPr id="14" name="Picture 13" descr="Chart, scatter chart&#10;&#10;Description automatically generated">
+            <a:extLst>
+              <a:ext uri="{FF2B5EF4-FFF2-40B4-BE49-F238E27FC236}">
+                <a16:creationId xmlns:a16="http://schemas.microsoft.com/office/drawing/2014/main" id="{1815F759-CB31-F673-9442-B4CC2EBB4A2E}"/>
+              </a:ext>
+            </a:extLst>
+          </p:cNvPr>
+          <p:cNvPicPr>
+            <a:picLocks noChangeAspect="1"/>
+          </p:cNvPicPr>
+          <p:nvPr/>
+        </p:nvPicPr>
+        <p:blipFill>
+          <a:blip r:embed="rId2">
+            <a:extLst>
+              <a:ext uri="{28A0092B-C50C-407E-A947-70E740481C1C}">
+                <a14:useLocalDpi xmlns:a14="http://schemas.microsoft.com/office/drawing/2010/main" val="0"/>
+              </a:ext>
+            </a:extLst>
+          </a:blip>
+          <a:stretch>
+            <a:fillRect/>
+          </a:stretch>
+        </p:blipFill>
+        <p:spPr>
+          <a:xfrm>
+            <a:off x="80171" y="1550500"/>
+            <a:ext cx="4419607" cy="3472548"/>
+          </a:xfrm>
+          <a:prstGeom prst="rect">
+            <a:avLst/>
+          </a:prstGeom>
+        </p:spPr>
+      </p:pic>
+      <p:pic>
+        <p:nvPicPr>
+          <p:cNvPr id="16" name="Picture 15" descr="Chart, scatter chart&#10;&#10;Description automatically generated">
+            <a:extLst>
+              <a:ext uri="{FF2B5EF4-FFF2-40B4-BE49-F238E27FC236}">
+                <a16:creationId xmlns:a16="http://schemas.microsoft.com/office/drawing/2014/main" id="{ADD8C889-A7B1-AE58-36D1-C3157FC5472A}"/>
+              </a:ext>
+            </a:extLst>
+          </p:cNvPr>
+          <p:cNvPicPr>
+            <a:picLocks noChangeAspect="1"/>
+          </p:cNvPicPr>
+          <p:nvPr/>
+        </p:nvPicPr>
+        <p:blipFill>
+          <a:blip r:embed="rId3">
+            <a:extLst>
+              <a:ext uri="{28A0092B-C50C-407E-A947-70E740481C1C}">
+                <a14:useLocalDpi xmlns:a14="http://schemas.microsoft.com/office/drawing/2010/main" val="0"/>
+              </a:ext>
+            </a:extLst>
+          </a:blip>
+          <a:stretch>
+            <a:fillRect/>
+          </a:stretch>
+        </p:blipFill>
+        <p:spPr>
+          <a:xfrm>
+            <a:off x="4911669" y="3503731"/>
+            <a:ext cx="4007255" cy="3148557"/>
+          </a:xfrm>
+          <a:prstGeom prst="rect">
+            <a:avLst/>
+          </a:prstGeom>
+        </p:spPr>
+      </p:pic>
+      <p:pic>
+        <p:nvPicPr>
+          <p:cNvPr id="21" name="Picture 20" descr="Chart, scatter chart&#10;&#10;Description automatically generated">
+            <a:extLst>
+              <a:ext uri="{FF2B5EF4-FFF2-40B4-BE49-F238E27FC236}">
+                <a16:creationId xmlns:a16="http://schemas.microsoft.com/office/drawing/2014/main" id="{345A5168-8131-70CC-522C-282E8DA2F44C}"/>
+              </a:ext>
+            </a:extLst>
+          </p:cNvPr>
+          <p:cNvPicPr>
+            <a:picLocks noChangeAspect="1"/>
+          </p:cNvPicPr>
+          <p:nvPr/>
+        </p:nvPicPr>
+        <p:blipFill>
+          <a:blip r:embed="rId4">
+            <a:extLst>
+              <a:ext uri="{28A0092B-C50C-407E-A947-70E740481C1C}">
+                <a14:useLocalDpi xmlns:a14="http://schemas.microsoft.com/office/drawing/2010/main" val="0"/>
+              </a:ext>
+            </a:extLst>
+          </a:blip>
+          <a:stretch>
+            <a:fillRect/>
+          </a:stretch>
+        </p:blipFill>
+        <p:spPr>
+          <a:xfrm>
+            <a:off x="4911669" y="280443"/>
+            <a:ext cx="4007255" cy="3148557"/>
+          </a:xfrm>
+          <a:prstGeom prst="rect">
+            <a:avLst/>
+          </a:prstGeom>
+        </p:spPr>
+      </p:pic>
+      <p:pic>
+        <p:nvPicPr>
+          <p:cNvPr id="18" name="Picture 17" descr="Chart, scatter chart&#10;&#10;Description automatically generated">
+            <a:extLst>
+              <a:ext uri="{FF2B5EF4-FFF2-40B4-BE49-F238E27FC236}">
+                <a16:creationId xmlns:a16="http://schemas.microsoft.com/office/drawing/2014/main" id="{839C166D-78A4-8FB1-0297-ECC15A5439F2}"/>
+              </a:ext>
+            </a:extLst>
+          </p:cNvPr>
+          <p:cNvPicPr>
+            <a:picLocks noChangeAspect="1"/>
+          </p:cNvPicPr>
+          <p:nvPr/>
+        </p:nvPicPr>
+        <p:blipFill>
+          <a:blip r:embed="rId5">
+            <a:extLst>
+              <a:ext uri="{28A0092B-C50C-407E-A947-70E740481C1C}">
+                <a14:useLocalDpi xmlns:a14="http://schemas.microsoft.com/office/drawing/2010/main" val="0"/>
+              </a:ext>
+            </a:extLst>
+          </a:blip>
+          <a:stretch>
+            <a:fillRect/>
+          </a:stretch>
+        </p:blipFill>
+        <p:spPr>
+          <a:xfrm>
+            <a:off x="8174147" y="280443"/>
+            <a:ext cx="4007255" cy="3148557"/>
+          </a:xfrm>
+          <a:prstGeom prst="rect">
+            <a:avLst/>
+          </a:prstGeom>
+        </p:spPr>
+      </p:pic>
+    </p:spTree>
+    <p:extLst>
+      <p:ext uri="{BB962C8B-B14F-4D97-AF65-F5344CB8AC3E}">
+        <p14:creationId xmlns:p14="http://schemas.microsoft.com/office/powerpoint/2010/main" val="2756569458"/>
+      </p:ext>
+    </p:extLst>
+  </p:cSld>
+  <p:clrMapOvr>
+    <a:masterClrMapping/>
+  </p:clrMapOvr>
+</p:sld>
+</file>
+
+<file path=ppt/slides/slide26.xml><?xml version="1.0" encoding="utf-8"?>
+<p:sld xmlns:a="http://schemas.openxmlformats.org/drawingml/2006/main" xmlns:r="http://schemas.openxmlformats.org/officeDocument/2006/relationships" xmlns:p="http://schemas.openxmlformats.org/presentationml/2006/main">
+  <p:cSld>
+    <p:spTree>
+      <p:nvGrpSpPr>
+        <p:cNvPr id="1" name=""/>
+        <p:cNvGrpSpPr/>
+        <p:nvPr/>
+      </p:nvGrpSpPr>
+      <p:grpSpPr>
+        <a:xfrm>
+          <a:off x="0" y="0"/>
+          <a:ext cx="0" cy="0"/>
+          <a:chOff x="0" y="0"/>
+          <a:chExt cx="0" cy="0"/>
+        </a:xfrm>
+      </p:grpSpPr>
+      <p:sp>
+        <p:nvSpPr>
+          <p:cNvPr id="2" name="Title 1">
+            <a:extLst>
+              <a:ext uri="{FF2B5EF4-FFF2-40B4-BE49-F238E27FC236}">
+                <a16:creationId xmlns:a16="http://schemas.microsoft.com/office/drawing/2014/main" id="{BC5DFE2C-EC3C-618F-59D2-D97D34FA651B}"/>
+              </a:ext>
+            </a:extLst>
+          </p:cNvPr>
+          <p:cNvSpPr>
+            <a:spLocks noGrp="1"/>
+          </p:cNvSpPr>
+          <p:nvPr>
+            <p:ph type="title"/>
+          </p:nvPr>
+        </p:nvSpPr>
+        <p:spPr>
+          <a:xfrm>
+            <a:off x="375138" y="262843"/>
+            <a:ext cx="8717347" cy="1073588"/>
+          </a:xfrm>
+        </p:spPr>
+        <p:txBody>
+          <a:bodyPr>
+            <a:noAutofit/>
+          </a:bodyPr>
+          <a:lstStyle/>
+          <a:p>
+            <a:r>
+              <a:rPr lang="en-AU" sz="2800"/>
+              <a:t>Male in 60plus PCA test separation using adonis by feeding Euclidean distance matrix to the model.</a:t>
+            </a:r>
+            <a:endParaRPr lang="en-US" sz="2800" dirty="0"/>
+          </a:p>
+        </p:txBody>
+      </p:sp>
+      <p:sp>
+        <p:nvSpPr>
+          <p:cNvPr id="3" name="TextBox 2">
+            <a:extLst>
+              <a:ext uri="{FF2B5EF4-FFF2-40B4-BE49-F238E27FC236}">
+                <a16:creationId xmlns:a16="http://schemas.microsoft.com/office/drawing/2014/main" id="{E29CD46D-6078-AC2F-CB5A-35C8DE794A2E}"/>
+              </a:ext>
+            </a:extLst>
+          </p:cNvPr>
+          <p:cNvSpPr txBox="1"/>
+          <p:nvPr/>
+        </p:nvSpPr>
+        <p:spPr>
+          <a:xfrm>
+            <a:off x="80171" y="5521568"/>
+            <a:ext cx="4818185" cy="584775"/>
+          </a:xfrm>
+          <a:prstGeom prst="rect">
+            <a:avLst/>
+          </a:prstGeom>
+          <a:noFill/>
+        </p:spPr>
+        <p:txBody>
+          <a:bodyPr wrap="square" rtlCol="0">
+            <a:spAutoFit/>
+          </a:bodyPr>
+          <a:lstStyle/>
+          <a:p>
+            <a:r>
+              <a:rPr lang="en-US" sz="1600">
+                <a:solidFill>
+                  <a:schemeClr val="tx1">
+                    <a:lumMod val="85000"/>
+                    <a:lumOff val="15000"/>
+                  </a:schemeClr>
+                </a:solidFill>
+                <a:latin typeface="Arial" panose="020B0604020202020204" pitchFamily="34" charset="0"/>
+                <a:cs typeface="Arial" panose="020B0604020202020204" pitchFamily="34" charset="0"/>
+              </a:rPr>
+              <a:t>vegan::permutest: p-value ~. Assumption OK.</a:t>
+            </a:r>
+          </a:p>
+          <a:p>
+            <a:r>
+              <a:rPr lang="en-US" sz="1600">
+                <a:solidFill>
+                  <a:schemeClr val="tx1">
+                    <a:lumMod val="85000"/>
+                    <a:lumOff val="15000"/>
+                  </a:schemeClr>
+                </a:solidFill>
+                <a:latin typeface="Arial" panose="020B0604020202020204" pitchFamily="34" charset="0"/>
+                <a:cs typeface="Arial" panose="020B0604020202020204" pitchFamily="34" charset="0"/>
+              </a:rPr>
+              <a:t>vegan::adonis: p-value. Groups are.  </a:t>
+            </a:r>
+            <a:endParaRPr lang="en-US" sz="1600" dirty="0">
+              <a:solidFill>
+                <a:schemeClr val="tx1">
+                  <a:lumMod val="85000"/>
+                  <a:lumOff val="15000"/>
+                </a:schemeClr>
+              </a:solidFill>
+              <a:latin typeface="Arial" panose="020B0604020202020204" pitchFamily="34" charset="0"/>
+              <a:cs typeface="Arial" panose="020B0604020202020204" pitchFamily="34" charset="0"/>
+            </a:endParaRPr>
+          </a:p>
+        </p:txBody>
+      </p:sp>
+      <p:sp>
+        <p:nvSpPr>
+          <p:cNvPr id="20" name="Rectangle: Rounded Corners 19">
+            <a:extLst>
+              <a:ext uri="{FF2B5EF4-FFF2-40B4-BE49-F238E27FC236}">
+                <a16:creationId xmlns:a16="http://schemas.microsoft.com/office/drawing/2014/main" id="{7DD8CF00-AC29-B310-CDBF-074C3A73FCA4}"/>
+              </a:ext>
+            </a:extLst>
+          </p:cNvPr>
+          <p:cNvSpPr/>
+          <p:nvPr/>
+        </p:nvSpPr>
+        <p:spPr>
+          <a:xfrm>
+            <a:off x="9253305" y="3729296"/>
+            <a:ext cx="2642995" cy="1592561"/>
+          </a:xfrm>
+          <a:prstGeom prst="roundRect">
+            <a:avLst/>
+          </a:prstGeom>
+          <a:solidFill>
+            <a:schemeClr val="bg1"/>
+          </a:solidFill>
+          <a:ln w="28575">
+            <a:solidFill>
+              <a:schemeClr val="bg1">
+                <a:lumMod val="65000"/>
+              </a:schemeClr>
+            </a:solidFill>
+          </a:ln>
+        </p:spPr>
+        <p:style>
+          <a:lnRef idx="2">
+            <a:schemeClr val="dk1"/>
+          </a:lnRef>
+          <a:fillRef idx="1">
+            <a:schemeClr val="lt1"/>
+          </a:fillRef>
+          <a:effectRef idx="0">
+            <a:schemeClr val="dk1"/>
+          </a:effectRef>
+          <a:fontRef idx="minor">
+            <a:schemeClr val="dk1"/>
+          </a:fontRef>
+        </p:style>
+        <p:txBody>
+          <a:bodyPr rtlCol="0" anchor="ctr"/>
+          <a:lstStyle/>
+          <a:p>
+            <a:pPr algn="ctr"/>
+            <a:r>
+              <a:rPr lang="en-US" sz="1600">
+                <a:latin typeface="Arial" panose="020B0604020202020204" pitchFamily="34" charset="0"/>
+                <a:cs typeface="Arial" panose="020B0604020202020204" pitchFamily="34" charset="0"/>
+              </a:rPr>
+              <a:t>Axes 1&amp;2</a:t>
+            </a:r>
+            <a:endParaRPr lang="en-US" sz="1600" dirty="0">
+              <a:latin typeface="Arial" panose="020B0604020202020204" pitchFamily="34" charset="0"/>
+              <a:cs typeface="Arial" panose="020B0604020202020204" pitchFamily="34" charset="0"/>
+            </a:endParaRPr>
+          </a:p>
+        </p:txBody>
+      </p:sp>
     </p:spTree>
     <p:extLst>
       <p:ext uri="{BB962C8B-B14F-4D97-AF65-F5344CB8AC3E}">
@@ -10359,7 +11310,7 @@
 </p:sld>
 </file>
 
-<file path=ppt/slides/slide26.xml><?xml version="1.0" encoding="utf-8"?>
+<file path=ppt/slides/slide27.xml><?xml version="1.0" encoding="utf-8"?>
 <p:sld xmlns:a="http://schemas.openxmlformats.org/drawingml/2006/main" xmlns:r="http://schemas.openxmlformats.org/officeDocument/2006/relationships" xmlns:p="http://schemas.openxmlformats.org/presentationml/2006/main">
   <p:cSld>
     <p:spTree>
@@ -10791,20 +11742,9 @@
 </p:sld>
 </file>
 
-<file path=ppt/slides/slide27.xml><?xml version="1.0" encoding="utf-8"?>
+<file path=ppt/slides/slide28.xml><?xml version="1.0" encoding="utf-8"?>
 <p:sld xmlns:a="http://schemas.openxmlformats.org/drawingml/2006/main" xmlns:r="http://schemas.openxmlformats.org/officeDocument/2006/relationships" xmlns:p="http://schemas.openxmlformats.org/presentationml/2006/main">
   <p:cSld>
-    <p:bg>
-      <p:bgPr>
-        <a:solidFill>
-          <a:schemeClr val="bg2">
-            <a:lumMod val="20000"/>
-            <a:lumOff val="80000"/>
-          </a:schemeClr>
-        </a:solidFill>
-        <a:effectLst/>
-      </p:bgPr>
-    </p:bg>
     <p:spTree>
       <p:nvGrpSpPr>
         <p:cNvPr id="1" name=""/>
@@ -11010,20 +11950,9 @@
 </p:sld>
 </file>
 
-<file path=ppt/slides/slide28.xml><?xml version="1.0" encoding="utf-8"?>
+<file path=ppt/slides/slide29.xml><?xml version="1.0" encoding="utf-8"?>
 <p:sld xmlns:a="http://schemas.openxmlformats.org/drawingml/2006/main" xmlns:r="http://schemas.openxmlformats.org/officeDocument/2006/relationships" xmlns:p="http://schemas.openxmlformats.org/presentationml/2006/main">
   <p:cSld>
-    <p:bg>
-      <p:bgPr>
-        <a:solidFill>
-          <a:schemeClr val="bg2">
-            <a:lumMod val="20000"/>
-            <a:lumOff val="80000"/>
-          </a:schemeClr>
-        </a:solidFill>
-        <a:effectLst/>
-      </p:bgPr>
-    </p:bg>
     <p:spTree>
       <p:nvGrpSpPr>
         <p:cNvPr id="1" name=""/>
@@ -11532,6 +12461,82 @@
           </a:prstGeom>
         </p:spPr>
       </p:pic>
+      <p:sp>
+        <p:nvSpPr>
+          <p:cNvPr id="3" name="Multiplication Sign 2">
+            <a:extLst>
+              <a:ext uri="{FF2B5EF4-FFF2-40B4-BE49-F238E27FC236}">
+                <a16:creationId xmlns:a16="http://schemas.microsoft.com/office/drawing/2014/main" id="{54004E50-C47A-5218-A889-6C92CA2C860D}"/>
+              </a:ext>
+            </a:extLst>
+          </p:cNvPr>
+          <p:cNvSpPr/>
+          <p:nvPr/>
+        </p:nvSpPr>
+        <p:spPr>
+          <a:xfrm>
+            <a:off x="2907563" y="624756"/>
+            <a:ext cx="7339680" cy="5970401"/>
+          </a:xfrm>
+          <a:prstGeom prst="mathMultiply">
+            <a:avLst>
+              <a:gd name="adj1" fmla="val 16528"/>
+            </a:avLst>
+          </a:prstGeom>
+          <a:solidFill>
+            <a:schemeClr val="accent3">
+              <a:lumMod val="60000"/>
+              <a:lumOff val="40000"/>
+            </a:schemeClr>
+          </a:solidFill>
+          <a:ln w="28575">
+            <a:solidFill>
+              <a:schemeClr val="bg1">
+                <a:lumMod val="65000"/>
+              </a:schemeClr>
+            </a:solidFill>
+          </a:ln>
+        </p:spPr>
+        <p:style>
+          <a:lnRef idx="2">
+            <a:schemeClr val="dk1"/>
+          </a:lnRef>
+          <a:fillRef idx="1">
+            <a:schemeClr val="lt1"/>
+          </a:fillRef>
+          <a:effectRef idx="0">
+            <a:schemeClr val="dk1"/>
+          </a:effectRef>
+          <a:fontRef idx="minor">
+            <a:schemeClr val="dk1"/>
+          </a:fontRef>
+        </p:style>
+        <p:txBody>
+          <a:bodyPr rtlCol="0" anchor="ctr"/>
+          <a:lstStyle/>
+          <a:p>
+            <a:pPr algn="l"/>
+            <a:r>
+              <a:rPr lang="en-US" sz="1600">
+                <a:solidFill>
+                  <a:srgbClr val="000000"/>
+                </a:solidFill>
+                <a:latin typeface="Arial" panose="020B0604020202020204" pitchFamily="34" charset="0"/>
+                <a:cs typeface="Arial" panose="020B0604020202020204" pitchFamily="34" charset="0"/>
+              </a:rPr>
+              <a:t>Order of levels of GLU_index is incorrect!!</a:t>
+            </a:r>
+            <a:endParaRPr lang="en-US" sz="1600" i="0" u="none" strike="noStrike">
+              <a:solidFill>
+                <a:srgbClr val="000000"/>
+              </a:solidFill>
+              <a:effectLst/>
+              <a:latin typeface="Arial" panose="020B0604020202020204" pitchFamily="34" charset="0"/>
+              <a:cs typeface="Arial" panose="020B0604020202020204" pitchFamily="34" charset="0"/>
+            </a:endParaRPr>
+          </a:p>
+        </p:txBody>
+      </p:sp>
     </p:spTree>
     <p:extLst>
       <p:ext uri="{BB962C8B-B14F-4D97-AF65-F5344CB8AC3E}">
@@ -11899,6 +12904,82 @@
           </a:prstGeom>
         </p:spPr>
       </p:pic>
+      <p:sp>
+        <p:nvSpPr>
+          <p:cNvPr id="3" name="Multiplication Sign 2">
+            <a:extLst>
+              <a:ext uri="{FF2B5EF4-FFF2-40B4-BE49-F238E27FC236}">
+                <a16:creationId xmlns:a16="http://schemas.microsoft.com/office/drawing/2014/main" id="{AD46F965-6884-C2D2-B78A-1AEAF34D1BCA}"/>
+              </a:ext>
+            </a:extLst>
+          </p:cNvPr>
+          <p:cNvSpPr/>
+          <p:nvPr/>
+        </p:nvSpPr>
+        <p:spPr>
+          <a:xfrm>
+            <a:off x="2907563" y="624756"/>
+            <a:ext cx="7339680" cy="5970401"/>
+          </a:xfrm>
+          <a:prstGeom prst="mathMultiply">
+            <a:avLst>
+              <a:gd name="adj1" fmla="val 16528"/>
+            </a:avLst>
+          </a:prstGeom>
+          <a:solidFill>
+            <a:schemeClr val="accent3">
+              <a:lumMod val="60000"/>
+              <a:lumOff val="40000"/>
+            </a:schemeClr>
+          </a:solidFill>
+          <a:ln w="28575">
+            <a:solidFill>
+              <a:schemeClr val="bg1">
+                <a:lumMod val="65000"/>
+              </a:schemeClr>
+            </a:solidFill>
+          </a:ln>
+        </p:spPr>
+        <p:style>
+          <a:lnRef idx="2">
+            <a:schemeClr val="dk1"/>
+          </a:lnRef>
+          <a:fillRef idx="1">
+            <a:schemeClr val="lt1"/>
+          </a:fillRef>
+          <a:effectRef idx="0">
+            <a:schemeClr val="dk1"/>
+          </a:effectRef>
+          <a:fontRef idx="minor">
+            <a:schemeClr val="dk1"/>
+          </a:fontRef>
+        </p:style>
+        <p:txBody>
+          <a:bodyPr rtlCol="0" anchor="ctr"/>
+          <a:lstStyle/>
+          <a:p>
+            <a:pPr algn="l"/>
+            <a:r>
+              <a:rPr lang="en-US" sz="1600">
+                <a:solidFill>
+                  <a:srgbClr val="000000"/>
+                </a:solidFill>
+                <a:latin typeface="Arial" panose="020B0604020202020204" pitchFamily="34" charset="0"/>
+                <a:cs typeface="Arial" panose="020B0604020202020204" pitchFamily="34" charset="0"/>
+              </a:rPr>
+              <a:t>Order of levels of GLU_index is incorrect!!</a:t>
+            </a:r>
+            <a:endParaRPr lang="en-US" sz="1600" i="0" u="none" strike="noStrike">
+              <a:solidFill>
+                <a:srgbClr val="000000"/>
+              </a:solidFill>
+              <a:effectLst/>
+              <a:latin typeface="Arial" panose="020B0604020202020204" pitchFamily="34" charset="0"/>
+              <a:cs typeface="Arial" panose="020B0604020202020204" pitchFamily="34" charset="0"/>
+            </a:endParaRPr>
+          </a:p>
+        </p:txBody>
+      </p:sp>
     </p:spTree>
     <p:extLst>
       <p:ext uri="{BB962C8B-B14F-4D97-AF65-F5344CB8AC3E}">
@@ -12211,6 +13292,82 @@
           </a:prstGeom>
         </p:spPr>
       </p:pic>
+      <p:sp>
+        <p:nvSpPr>
+          <p:cNvPr id="3" name="Multiplication Sign 2">
+            <a:extLst>
+              <a:ext uri="{FF2B5EF4-FFF2-40B4-BE49-F238E27FC236}">
+                <a16:creationId xmlns:a16="http://schemas.microsoft.com/office/drawing/2014/main" id="{6E0FDDD7-0740-2F5B-136B-5507594997C7}"/>
+              </a:ext>
+            </a:extLst>
+          </p:cNvPr>
+          <p:cNvSpPr/>
+          <p:nvPr/>
+        </p:nvSpPr>
+        <p:spPr>
+          <a:xfrm>
+            <a:off x="2907563" y="624756"/>
+            <a:ext cx="7339680" cy="5970401"/>
+          </a:xfrm>
+          <a:prstGeom prst="mathMultiply">
+            <a:avLst>
+              <a:gd name="adj1" fmla="val 16528"/>
+            </a:avLst>
+          </a:prstGeom>
+          <a:solidFill>
+            <a:schemeClr val="accent3">
+              <a:lumMod val="60000"/>
+              <a:lumOff val="40000"/>
+            </a:schemeClr>
+          </a:solidFill>
+          <a:ln w="28575">
+            <a:solidFill>
+              <a:schemeClr val="bg1">
+                <a:lumMod val="65000"/>
+              </a:schemeClr>
+            </a:solidFill>
+          </a:ln>
+        </p:spPr>
+        <p:style>
+          <a:lnRef idx="2">
+            <a:schemeClr val="dk1"/>
+          </a:lnRef>
+          <a:fillRef idx="1">
+            <a:schemeClr val="lt1"/>
+          </a:fillRef>
+          <a:effectRef idx="0">
+            <a:schemeClr val="dk1"/>
+          </a:effectRef>
+          <a:fontRef idx="minor">
+            <a:schemeClr val="dk1"/>
+          </a:fontRef>
+        </p:style>
+        <p:txBody>
+          <a:bodyPr rtlCol="0" anchor="ctr"/>
+          <a:lstStyle/>
+          <a:p>
+            <a:pPr algn="l"/>
+            <a:r>
+              <a:rPr lang="en-US" sz="1600">
+                <a:solidFill>
+                  <a:srgbClr val="000000"/>
+                </a:solidFill>
+                <a:latin typeface="Arial" panose="020B0604020202020204" pitchFamily="34" charset="0"/>
+                <a:cs typeface="Arial" panose="020B0604020202020204" pitchFamily="34" charset="0"/>
+              </a:rPr>
+              <a:t>Order of levels of GLU_index is incorrect!!</a:t>
+            </a:r>
+            <a:endParaRPr lang="en-US" sz="1600" i="0" u="none" strike="noStrike">
+              <a:solidFill>
+                <a:srgbClr val="000000"/>
+              </a:solidFill>
+              <a:effectLst/>
+              <a:latin typeface="Arial" panose="020B0604020202020204" pitchFamily="34" charset="0"/>
+              <a:cs typeface="Arial" panose="020B0604020202020204" pitchFamily="34" charset="0"/>
+            </a:endParaRPr>
+          </a:p>
+        </p:txBody>
+      </p:sp>
     </p:spTree>
     <p:extLst>
       <p:ext uri="{BB962C8B-B14F-4D97-AF65-F5344CB8AC3E}">
@@ -12633,6 +13790,82 @@
               <a:t>Maybe 3D will work…?</a:t>
             </a:r>
             <a:endParaRPr lang="en-US" sz="1600" dirty="0">
+              <a:latin typeface="Arial" panose="020B0604020202020204" pitchFamily="34" charset="0"/>
+              <a:cs typeface="Arial" panose="020B0604020202020204" pitchFamily="34" charset="0"/>
+            </a:endParaRPr>
+          </a:p>
+        </p:txBody>
+      </p:sp>
+      <p:sp>
+        <p:nvSpPr>
+          <p:cNvPr id="5" name="Multiplication Sign 4">
+            <a:extLst>
+              <a:ext uri="{FF2B5EF4-FFF2-40B4-BE49-F238E27FC236}">
+                <a16:creationId xmlns:a16="http://schemas.microsoft.com/office/drawing/2014/main" id="{D80DBE2A-D4B4-76B2-A5AE-231A5D4470AD}"/>
+              </a:ext>
+            </a:extLst>
+          </p:cNvPr>
+          <p:cNvSpPr/>
+          <p:nvPr/>
+        </p:nvSpPr>
+        <p:spPr>
+          <a:xfrm>
+            <a:off x="2907563" y="624756"/>
+            <a:ext cx="7339680" cy="5970401"/>
+          </a:xfrm>
+          <a:prstGeom prst="mathMultiply">
+            <a:avLst>
+              <a:gd name="adj1" fmla="val 16528"/>
+            </a:avLst>
+          </a:prstGeom>
+          <a:solidFill>
+            <a:schemeClr val="accent3">
+              <a:lumMod val="60000"/>
+              <a:lumOff val="40000"/>
+            </a:schemeClr>
+          </a:solidFill>
+          <a:ln w="28575">
+            <a:solidFill>
+              <a:schemeClr val="bg1">
+                <a:lumMod val="65000"/>
+              </a:schemeClr>
+            </a:solidFill>
+          </a:ln>
+        </p:spPr>
+        <p:style>
+          <a:lnRef idx="2">
+            <a:schemeClr val="dk1"/>
+          </a:lnRef>
+          <a:fillRef idx="1">
+            <a:schemeClr val="lt1"/>
+          </a:fillRef>
+          <a:effectRef idx="0">
+            <a:schemeClr val="dk1"/>
+          </a:effectRef>
+          <a:fontRef idx="minor">
+            <a:schemeClr val="dk1"/>
+          </a:fontRef>
+        </p:style>
+        <p:txBody>
+          <a:bodyPr rtlCol="0" anchor="ctr"/>
+          <a:lstStyle/>
+          <a:p>
+            <a:pPr algn="l"/>
+            <a:r>
+              <a:rPr lang="en-US" sz="1600">
+                <a:solidFill>
+                  <a:srgbClr val="000000"/>
+                </a:solidFill>
+                <a:latin typeface="Arial" panose="020B0604020202020204" pitchFamily="34" charset="0"/>
+                <a:cs typeface="Arial" panose="020B0604020202020204" pitchFamily="34" charset="0"/>
+              </a:rPr>
+              <a:t>Order of levels of GLU_index is incorrect!!</a:t>
+            </a:r>
+            <a:endParaRPr lang="en-US" sz="1600" i="0" u="none" strike="noStrike">
+              <a:solidFill>
+                <a:srgbClr val="000000"/>
+              </a:solidFill>
+              <a:effectLst/>
               <a:latin typeface="Arial" panose="020B0604020202020204" pitchFamily="34" charset="0"/>
               <a:cs typeface="Arial" panose="020B0604020202020204" pitchFamily="34" charset="0"/>
             </a:endParaRPr>
@@ -13134,6 +14367,82 @@
           </a:prstGeom>
         </p:spPr>
       </p:pic>
+      <p:sp>
+        <p:nvSpPr>
+          <p:cNvPr id="3" name="Multiplication Sign 2">
+            <a:extLst>
+              <a:ext uri="{FF2B5EF4-FFF2-40B4-BE49-F238E27FC236}">
+                <a16:creationId xmlns:a16="http://schemas.microsoft.com/office/drawing/2014/main" id="{AEFC09B9-E52F-7F3C-3AC7-5D86C6561136}"/>
+              </a:ext>
+            </a:extLst>
+          </p:cNvPr>
+          <p:cNvSpPr/>
+          <p:nvPr/>
+        </p:nvSpPr>
+        <p:spPr>
+          <a:xfrm>
+            <a:off x="2907563" y="624756"/>
+            <a:ext cx="7339680" cy="5970401"/>
+          </a:xfrm>
+          <a:prstGeom prst="mathMultiply">
+            <a:avLst>
+              <a:gd name="adj1" fmla="val 16528"/>
+            </a:avLst>
+          </a:prstGeom>
+          <a:solidFill>
+            <a:schemeClr val="accent3">
+              <a:lumMod val="60000"/>
+              <a:lumOff val="40000"/>
+            </a:schemeClr>
+          </a:solidFill>
+          <a:ln w="28575">
+            <a:solidFill>
+              <a:schemeClr val="bg1">
+                <a:lumMod val="65000"/>
+              </a:schemeClr>
+            </a:solidFill>
+          </a:ln>
+        </p:spPr>
+        <p:style>
+          <a:lnRef idx="2">
+            <a:schemeClr val="dk1"/>
+          </a:lnRef>
+          <a:fillRef idx="1">
+            <a:schemeClr val="lt1"/>
+          </a:fillRef>
+          <a:effectRef idx="0">
+            <a:schemeClr val="dk1"/>
+          </a:effectRef>
+          <a:fontRef idx="minor">
+            <a:schemeClr val="dk1"/>
+          </a:fontRef>
+        </p:style>
+        <p:txBody>
+          <a:bodyPr rtlCol="0" anchor="ctr"/>
+          <a:lstStyle/>
+          <a:p>
+            <a:pPr algn="l"/>
+            <a:r>
+              <a:rPr lang="en-US" sz="1600">
+                <a:solidFill>
+                  <a:srgbClr val="000000"/>
+                </a:solidFill>
+                <a:latin typeface="Arial" panose="020B0604020202020204" pitchFamily="34" charset="0"/>
+                <a:cs typeface="Arial" panose="020B0604020202020204" pitchFamily="34" charset="0"/>
+              </a:rPr>
+              <a:t>Order of levels of GLU_index is incorrect!!</a:t>
+            </a:r>
+            <a:endParaRPr lang="en-US" sz="1600" i="0" u="none" strike="noStrike">
+              <a:solidFill>
+                <a:srgbClr val="000000"/>
+              </a:solidFill>
+              <a:effectLst/>
+              <a:latin typeface="Arial" panose="020B0604020202020204" pitchFamily="34" charset="0"/>
+              <a:cs typeface="Arial" panose="020B0604020202020204" pitchFamily="34" charset="0"/>
+            </a:endParaRPr>
+          </a:p>
+        </p:txBody>
+      </p:sp>
     </p:spTree>
     <p:extLst>
       <p:ext uri="{BB962C8B-B14F-4D97-AF65-F5344CB8AC3E}">
@@ -13548,6 +14857,82 @@
           </a:p>
         </p:txBody>
       </p:sp>
+      <p:sp>
+        <p:nvSpPr>
+          <p:cNvPr id="3" name="Multiplication Sign 2">
+            <a:extLst>
+              <a:ext uri="{FF2B5EF4-FFF2-40B4-BE49-F238E27FC236}">
+                <a16:creationId xmlns:a16="http://schemas.microsoft.com/office/drawing/2014/main" id="{92474935-3233-80FC-722C-160BE1B3D7D3}"/>
+              </a:ext>
+            </a:extLst>
+          </p:cNvPr>
+          <p:cNvSpPr/>
+          <p:nvPr/>
+        </p:nvSpPr>
+        <p:spPr>
+          <a:xfrm>
+            <a:off x="2907563" y="624756"/>
+            <a:ext cx="7339680" cy="5970401"/>
+          </a:xfrm>
+          <a:prstGeom prst="mathMultiply">
+            <a:avLst>
+              <a:gd name="adj1" fmla="val 16528"/>
+            </a:avLst>
+          </a:prstGeom>
+          <a:solidFill>
+            <a:schemeClr val="accent3">
+              <a:lumMod val="60000"/>
+              <a:lumOff val="40000"/>
+            </a:schemeClr>
+          </a:solidFill>
+          <a:ln w="28575">
+            <a:solidFill>
+              <a:schemeClr val="bg1">
+                <a:lumMod val="65000"/>
+              </a:schemeClr>
+            </a:solidFill>
+          </a:ln>
+        </p:spPr>
+        <p:style>
+          <a:lnRef idx="2">
+            <a:schemeClr val="dk1"/>
+          </a:lnRef>
+          <a:fillRef idx="1">
+            <a:schemeClr val="lt1"/>
+          </a:fillRef>
+          <a:effectRef idx="0">
+            <a:schemeClr val="dk1"/>
+          </a:effectRef>
+          <a:fontRef idx="minor">
+            <a:schemeClr val="dk1"/>
+          </a:fontRef>
+        </p:style>
+        <p:txBody>
+          <a:bodyPr rtlCol="0" anchor="ctr"/>
+          <a:lstStyle/>
+          <a:p>
+            <a:pPr algn="l"/>
+            <a:r>
+              <a:rPr lang="en-US" sz="1600">
+                <a:solidFill>
+                  <a:srgbClr val="000000"/>
+                </a:solidFill>
+                <a:latin typeface="Arial" panose="020B0604020202020204" pitchFamily="34" charset="0"/>
+                <a:cs typeface="Arial" panose="020B0604020202020204" pitchFamily="34" charset="0"/>
+              </a:rPr>
+              <a:t>Order of levels of GLU_index is incorrect!!</a:t>
+            </a:r>
+            <a:endParaRPr lang="en-US" sz="1600" i="0" u="none" strike="noStrike">
+              <a:solidFill>
+                <a:srgbClr val="000000"/>
+              </a:solidFill>
+              <a:effectLst/>
+              <a:latin typeface="Arial" panose="020B0604020202020204" pitchFamily="34" charset="0"/>
+              <a:cs typeface="Arial" panose="020B0604020202020204" pitchFamily="34" charset="0"/>
+            </a:endParaRPr>
+          </a:p>
+        </p:txBody>
+      </p:sp>
     </p:spTree>
     <p:extLst>
       <p:ext uri="{BB962C8B-B14F-4D97-AF65-F5344CB8AC3E}">
@@ -13732,6 +15117,83 @@
           </a:graphicData>
         </a:graphic>
       </p:graphicFrame>
+      <p:sp>
+        <p:nvSpPr>
+          <p:cNvPr id="3" name="Multiplication Sign 2">
+            <a:extLst>
+              <a:ext uri="{FF2B5EF4-FFF2-40B4-BE49-F238E27FC236}">
+                <a16:creationId xmlns:a16="http://schemas.microsoft.com/office/drawing/2014/main" id="{28602F27-9316-DA12-7258-4B2046001393}"/>
+              </a:ext>
+            </a:extLst>
+          </p:cNvPr>
+          <p:cNvSpPr/>
+          <p:nvPr/>
+        </p:nvSpPr>
+        <p:spPr>
+          <a:xfrm>
+            <a:off x="3059963" y="777156"/>
+            <a:ext cx="7339680" cy="5970401"/>
+          </a:xfrm>
+          <a:prstGeom prst="mathMultiply">
+            <a:avLst>
+              <a:gd name="adj1" fmla="val 16528"/>
+            </a:avLst>
+          </a:prstGeom>
+          <a:solidFill>
+            <a:schemeClr val="accent4">
+              <a:lumMod val="60000"/>
+              <a:lumOff val="40000"/>
+            </a:schemeClr>
+          </a:solidFill>
+          <a:ln w="28575">
+            <a:solidFill>
+              <a:schemeClr val="accent4">
+                <a:lumMod val="60000"/>
+                <a:lumOff val="40000"/>
+              </a:schemeClr>
+            </a:solidFill>
+          </a:ln>
+        </p:spPr>
+        <p:style>
+          <a:lnRef idx="2">
+            <a:schemeClr val="dk1"/>
+          </a:lnRef>
+          <a:fillRef idx="1">
+            <a:schemeClr val="lt1"/>
+          </a:fillRef>
+          <a:effectRef idx="0">
+            <a:schemeClr val="dk1"/>
+          </a:effectRef>
+          <a:fontRef idx="minor">
+            <a:schemeClr val="dk1"/>
+          </a:fontRef>
+        </p:style>
+        <p:txBody>
+          <a:bodyPr rtlCol="0" anchor="ctr"/>
+          <a:lstStyle/>
+          <a:p>
+            <a:pPr algn="l"/>
+            <a:r>
+              <a:rPr lang="en-US" sz="1600">
+                <a:solidFill>
+                  <a:srgbClr val="000000"/>
+                </a:solidFill>
+                <a:latin typeface="Arial" panose="020B0604020202020204" pitchFamily="34" charset="0"/>
+                <a:cs typeface="Arial" panose="020B0604020202020204" pitchFamily="34" charset="0"/>
+              </a:rPr>
+              <a:t>Order of levels of GLU_index is incorrect, but the results (var explained) itself is not wrong.</a:t>
+            </a:r>
+            <a:endParaRPr lang="en-US" sz="1600" i="0" u="none" strike="noStrike">
+              <a:solidFill>
+                <a:srgbClr val="000000"/>
+              </a:solidFill>
+              <a:effectLst/>
+              <a:latin typeface="Arial" panose="020B0604020202020204" pitchFamily="34" charset="0"/>
+              <a:cs typeface="Arial" panose="020B0604020202020204" pitchFamily="34" charset="0"/>
+            </a:endParaRPr>
+          </a:p>
+        </p:txBody>
+      </p:sp>
     </p:spTree>
     <p:extLst>
       <p:ext uri="{BB962C8B-B14F-4D97-AF65-F5344CB8AC3E}">

</xml_diff>